<commit_message>
update Abe case, slides
</commit_message>
<xml_diff>
--- a/Slides/slides_cycleprops_f14.pptx
+++ b/Slides/slides_cycleprops_f14.pptx
@@ -5,46 +5,49 @@
     <p:sldMasterId id="2147483648" r:id="rId1"/>
   </p:sldMasterIdLst>
   <p:notesMasterIdLst>
-    <p:notesMasterId r:id="rId36"/>
+    <p:notesMasterId r:id="rId39"/>
   </p:notesMasterIdLst>
   <p:handoutMasterIdLst>
-    <p:handoutMasterId r:id="rId37"/>
+    <p:handoutMasterId r:id="rId40"/>
   </p:handoutMasterIdLst>
   <p:sldIdLst>
     <p:sldId id="256" r:id="rId2"/>
     <p:sldId id="450" r:id="rId3"/>
     <p:sldId id="404" r:id="rId4"/>
     <p:sldId id="321" r:id="rId5"/>
-    <p:sldId id="449" r:id="rId6"/>
-    <p:sldId id="426" r:id="rId7"/>
-    <p:sldId id="427" r:id="rId8"/>
-    <p:sldId id="428" r:id="rId9"/>
-    <p:sldId id="429" r:id="rId10"/>
-    <p:sldId id="300" r:id="rId11"/>
-    <p:sldId id="405" r:id="rId12"/>
-    <p:sldId id="411" r:id="rId13"/>
-    <p:sldId id="410" r:id="rId14"/>
-    <p:sldId id="409" r:id="rId15"/>
-    <p:sldId id="418" r:id="rId16"/>
-    <p:sldId id="419" r:id="rId17"/>
-    <p:sldId id="421" r:id="rId18"/>
-    <p:sldId id="422" r:id="rId19"/>
-    <p:sldId id="425" r:id="rId20"/>
-    <p:sldId id="430" r:id="rId21"/>
-    <p:sldId id="435" r:id="rId22"/>
-    <p:sldId id="445" r:id="rId23"/>
-    <p:sldId id="440" r:id="rId24"/>
-    <p:sldId id="441" r:id="rId25"/>
-    <p:sldId id="436" r:id="rId26"/>
-    <p:sldId id="437" r:id="rId27"/>
-    <p:sldId id="442" r:id="rId28"/>
-    <p:sldId id="443" r:id="rId29"/>
-    <p:sldId id="444" r:id="rId30"/>
-    <p:sldId id="448" r:id="rId31"/>
-    <p:sldId id="447" r:id="rId32"/>
-    <p:sldId id="432" r:id="rId33"/>
-    <p:sldId id="431" r:id="rId34"/>
-    <p:sldId id="406" r:id="rId35"/>
+    <p:sldId id="451" r:id="rId6"/>
+    <p:sldId id="449" r:id="rId7"/>
+    <p:sldId id="426" r:id="rId8"/>
+    <p:sldId id="427" r:id="rId9"/>
+    <p:sldId id="428" r:id="rId10"/>
+    <p:sldId id="429" r:id="rId11"/>
+    <p:sldId id="452" r:id="rId12"/>
+    <p:sldId id="300" r:id="rId13"/>
+    <p:sldId id="405" r:id="rId14"/>
+    <p:sldId id="411" r:id="rId15"/>
+    <p:sldId id="410" r:id="rId16"/>
+    <p:sldId id="409" r:id="rId17"/>
+    <p:sldId id="418" r:id="rId18"/>
+    <p:sldId id="419" r:id="rId19"/>
+    <p:sldId id="421" r:id="rId20"/>
+    <p:sldId id="422" r:id="rId21"/>
+    <p:sldId id="425" r:id="rId22"/>
+    <p:sldId id="453" r:id="rId23"/>
+    <p:sldId id="430" r:id="rId24"/>
+    <p:sldId id="435" r:id="rId25"/>
+    <p:sldId id="445" r:id="rId26"/>
+    <p:sldId id="440" r:id="rId27"/>
+    <p:sldId id="441" r:id="rId28"/>
+    <p:sldId id="436" r:id="rId29"/>
+    <p:sldId id="437" r:id="rId30"/>
+    <p:sldId id="442" r:id="rId31"/>
+    <p:sldId id="443" r:id="rId32"/>
+    <p:sldId id="444" r:id="rId33"/>
+    <p:sldId id="448" r:id="rId34"/>
+    <p:sldId id="447" r:id="rId35"/>
+    <p:sldId id="432" r:id="rId36"/>
+    <p:sldId id="431" r:id="rId37"/>
+    <p:sldId id="406" r:id="rId38"/>
   </p:sldIdLst>
   <p:sldSz cx="9144000" cy="6858000" type="screen4x3"/>
   <p:notesSz cx="7099300" cy="10234613"/>
@@ -175,7 +178,7 @@
   </p:defaultTextStyle>
   <p:extLst>
     <p:ext uri="{EFAFB233-063F-42B5-8137-9DF3F51BA10A}">
-      <p15:sldGuideLst xmlns:p15="http://schemas.microsoft.com/office/powerpoint/2012/main" xmlns="">
+      <p15:sldGuideLst xmlns:p15="http://schemas.microsoft.com/office/powerpoint/2012/main">
         <p15:guide id="1" orient="horz" pos="2160">
           <p15:clr>
             <a:srgbClr val="A4A3A4"/>
@@ -1001,6 +1004,119 @@
     <p:extLst>
       <p:ext uri="{BB962C8B-B14F-4D97-AF65-F5344CB8AC3E}">
         <p14:creationId xmlns:p14="http://schemas.microsoft.com/office/powerpoint/2010/main" val="2933981370"/>
+      </p:ext>
+    </p:extLst>
+  </p:cSld>
+  <p:clrMapOvr>
+    <a:masterClrMapping/>
+  </p:clrMapOvr>
+</p:notes>
+</file>
+
+<file path=ppt/notesSlides/notesSlide2.xml><?xml version="1.0" encoding="utf-8"?>
+<p:notes xmlns:a="http://schemas.openxmlformats.org/drawingml/2006/main" xmlns:r="http://schemas.openxmlformats.org/officeDocument/2006/relationships" xmlns:p="http://schemas.openxmlformats.org/presentationml/2006/main">
+  <p:cSld>
+    <p:spTree>
+      <p:nvGrpSpPr>
+        <p:cNvPr id="1" name=""/>
+        <p:cNvGrpSpPr/>
+        <p:nvPr/>
+      </p:nvGrpSpPr>
+      <p:grpSpPr>
+        <a:xfrm>
+          <a:off x="0" y="0"/>
+          <a:ext cx="0" cy="0"/>
+          <a:chOff x="0" y="0"/>
+          <a:chExt cx="0" cy="0"/>
+        </a:xfrm>
+      </p:grpSpPr>
+      <p:sp>
+        <p:nvSpPr>
+          <p:cNvPr id="2" name="Slide Image Placeholder 1"/>
+          <p:cNvSpPr>
+            <a:spLocks noGrp="1" noRot="1" noChangeAspect="1"/>
+          </p:cNvSpPr>
+          <p:nvPr>
+            <p:ph type="sldImg"/>
+          </p:nvPr>
+        </p:nvSpPr>
+        <p:spPr/>
+      </p:sp>
+      <p:sp>
+        <p:nvSpPr>
+          <p:cNvPr id="3" name="Notes Placeholder 2"/>
+          <p:cNvSpPr>
+            <a:spLocks noGrp="1"/>
+          </p:cNvSpPr>
+          <p:nvPr>
+            <p:ph type="body" idx="1"/>
+          </p:nvPr>
+        </p:nvSpPr>
+        <p:spPr/>
+        <p:txBody>
+          <a:bodyPr/>
+          <a:lstStyle/>
+          <a:p>
+            <a:pPr marL="0" marR="0" indent="0" algn="l" defTabSz="914400" rtl="0" eaLnBrk="0" fontAlgn="base" latinLnBrk="0" hangingPunct="0">
+              <a:lnSpc>
+                <a:spcPct val="100000"/>
+              </a:lnSpc>
+              <a:spcBef>
+                <a:spcPct val="30000"/>
+              </a:spcBef>
+              <a:spcAft>
+                <a:spcPct val="0"/>
+              </a:spcAft>
+              <a:buClrTx/>
+              <a:buSzTx/>
+              <a:buFontTx/>
+              <a:buNone/>
+              <a:tabLst/>
+              <a:defRPr/>
+            </a:pPr>
+            <a:r>
+              <a:rPr lang="en-US" sz="1200" dirty="0" smtClean="0"/>
+              <a:t>http://qz.com/285380/a-london-school-teacher-pays-more-uk-tax-than-facebook/</a:t>
+            </a:r>
+          </a:p>
+          <a:p>
+            <a:endParaRPr lang="en-US" dirty="0"/>
+          </a:p>
+        </p:txBody>
+      </p:sp>
+      <p:sp>
+        <p:nvSpPr>
+          <p:cNvPr id="4" name="Slide Number Placeholder 3"/>
+          <p:cNvSpPr>
+            <a:spLocks noGrp="1"/>
+          </p:cNvSpPr>
+          <p:nvPr>
+            <p:ph type="sldNum" sz="quarter" idx="10"/>
+          </p:nvPr>
+        </p:nvSpPr>
+        <p:spPr/>
+        <p:txBody>
+          <a:bodyPr/>
+          <a:lstStyle/>
+          <a:p>
+            <a:pPr>
+              <a:defRPr/>
+            </a:pPr>
+            <a:fld id="{B0384826-C387-481E-B59F-01706DB12BEA}" type="slidenum">
+              <a:rPr lang="en-US" smtClean="0"/>
+              <a:pPr>
+                <a:defRPr/>
+              </a:pPr>
+              <a:t>5</a:t>
+            </a:fld>
+            <a:endParaRPr lang="en-US"/>
+          </a:p>
+        </p:txBody>
+      </p:sp>
+    </p:spTree>
+    <p:extLst>
+      <p:ext uri="{BB962C8B-B14F-4D97-AF65-F5344CB8AC3E}">
+        <p14:creationId xmlns:p14="http://schemas.microsoft.com/office/powerpoint/2010/main" val="3684914927"/>
       </p:ext>
     </p:extLst>
   </p:cSld>
@@ -4754,12 +4870,12 @@
       </p:grpSpPr>
       <p:sp>
         <p:nvSpPr>
-          <p:cNvPr id="57346" name="Rectangle 4"/>
+          <p:cNvPr id="4098" name="Rectangle 2"/>
           <p:cNvSpPr>
             <a:spLocks noGrp="1" noChangeArrowheads="1"/>
           </p:cNvSpPr>
           <p:nvPr>
-            <p:ph type="ctrTitle"/>
+            <p:ph type="title" idx="4294967295"/>
           </p:nvPr>
         </p:nvSpPr>
         <p:spPr/>
@@ -4767,14 +4883,70 @@
           <a:bodyPr/>
           <a:lstStyle/>
           <a:p>
-            <a:pPr eaLnBrk="1" hangingPunct="1"/>
-            <a:r>
-              <a:rPr lang="en-US" i="1" dirty="0" smtClean="0"/>
-              <a:t>Volatility</a:t>
-            </a:r>
-          </a:p>
-        </p:txBody>
-      </p:sp>
+            <a:pPr algn="l" eaLnBrk="1" hangingPunct="1"/>
+            <a:r>
+              <a:rPr lang="en-US" dirty="0" smtClean="0"/>
+              <a:t>Business cycles:  recent history</a:t>
+            </a:r>
+          </a:p>
+        </p:txBody>
+      </p:sp>
+      <p:sp>
+        <p:nvSpPr>
+          <p:cNvPr id="4100" name="Slide Number Placeholder 3"/>
+          <p:cNvSpPr>
+            <a:spLocks noGrp="1"/>
+          </p:cNvSpPr>
+          <p:nvPr>
+            <p:ph type="sldNum" sz="quarter" idx="12"/>
+          </p:nvPr>
+        </p:nvSpPr>
+        <p:spPr>
+          <a:noFill/>
+        </p:spPr>
+        <p:txBody>
+          <a:bodyPr/>
+          <a:lstStyle/>
+          <a:p>
+            <a:fld id="{E041A9CD-8F68-446A-8192-3D8982304C37}" type="slidenum">
+              <a:rPr lang="en-US" smtClean="0"/>
+              <a:pPr/>
+              <a:t>10</a:t>
+            </a:fld>
+            <a:endParaRPr lang="en-US" smtClean="0"/>
+          </a:p>
+        </p:txBody>
+      </p:sp>
+      <p:pic>
+        <p:nvPicPr>
+          <p:cNvPr id="2" name="Picture 1"/>
+          <p:cNvPicPr>
+            <a:picLocks noChangeAspect="1"/>
+          </p:cNvPicPr>
+          <p:nvPr/>
+        </p:nvPicPr>
+        <p:blipFill>
+          <a:blip r:embed="rId2">
+            <a:extLst>
+              <a:ext uri="{28A0092B-C50C-407E-A947-70E740481C1C}">
+                <a14:useLocalDpi xmlns:a14="http://schemas.microsoft.com/office/drawing/2010/main" val="0"/>
+              </a:ext>
+            </a:extLst>
+          </a:blip>
+          <a:stretch>
+            <a:fillRect/>
+          </a:stretch>
+        </p:blipFill>
+        <p:spPr>
+          <a:xfrm>
+            <a:off x="838200" y="987425"/>
+            <a:ext cx="7086600" cy="5314950"/>
+          </a:xfrm>
+          <a:prstGeom prst="rect">
+            <a:avLst/>
+          </a:prstGeom>
+        </p:spPr>
+      </p:pic>
     </p:spTree>
   </p:cSld>
   <p:clrMapOvr>
@@ -4825,7 +4997,145 @@
             <a:pPr algn="l" eaLnBrk="1" hangingPunct="1"/>
             <a:r>
               <a:rPr lang="en-US" dirty="0" smtClean="0"/>
-              <a:t>US GDP (annual)</a:t>
+              <a:t>Business cycles:  who cares? </a:t>
+            </a:r>
+          </a:p>
+        </p:txBody>
+      </p:sp>
+      <p:sp>
+        <p:nvSpPr>
+          <p:cNvPr id="4099" name="Rectangle 3"/>
+          <p:cNvSpPr>
+            <a:spLocks noGrp="1" noChangeArrowheads="1"/>
+          </p:cNvSpPr>
+          <p:nvPr>
+            <p:ph type="body" idx="4294967295"/>
+          </p:nvPr>
+        </p:nvSpPr>
+        <p:spPr/>
+        <p:txBody>
+          <a:bodyPr/>
+          <a:lstStyle/>
+          <a:p>
+            <a:pPr eaLnBrk="1" hangingPunct="1">
+              <a:spcBef>
+                <a:spcPts val="1200"/>
+              </a:spcBef>
+              <a:spcAft>
+                <a:spcPts val="600"/>
+              </a:spcAft>
+            </a:pPr>
+            <a:r>
+              <a:rPr lang="en-US" sz="2400" dirty="0" smtClean="0"/>
+              <a:t>Finance </a:t>
+            </a:r>
+          </a:p>
+          <a:p>
+            <a:pPr lvl="1" eaLnBrk="1" hangingPunct="1">
+              <a:lnSpc>
+                <a:spcPct val="90000"/>
+              </a:lnSpc>
+              <a:spcBef>
+                <a:spcPts val="600"/>
+              </a:spcBef>
+            </a:pPr>
+            <a:r>
+              <a:rPr lang="en-US" sz="2000" dirty="0" smtClean="0"/>
+              <a:t>Fixed income </a:t>
+            </a:r>
+          </a:p>
+          <a:p>
+            <a:pPr lvl="1" eaLnBrk="1" hangingPunct="1">
+              <a:lnSpc>
+                <a:spcPct val="90000"/>
+              </a:lnSpc>
+              <a:spcBef>
+                <a:spcPts val="600"/>
+              </a:spcBef>
+            </a:pPr>
+            <a:r>
+              <a:rPr lang="en-US" sz="2000" dirty="0" smtClean="0"/>
+              <a:t>Currencies </a:t>
+            </a:r>
+          </a:p>
+          <a:p>
+            <a:pPr lvl="1" eaLnBrk="1" hangingPunct="1">
+              <a:lnSpc>
+                <a:spcPct val="90000"/>
+              </a:lnSpc>
+              <a:spcBef>
+                <a:spcPts val="600"/>
+              </a:spcBef>
+            </a:pPr>
+            <a:r>
+              <a:rPr lang="en-US" sz="2000" dirty="0" smtClean="0"/>
+              <a:t>Asset management </a:t>
+            </a:r>
+          </a:p>
+          <a:p>
+            <a:pPr lvl="1" eaLnBrk="1" hangingPunct="1">
+              <a:lnSpc>
+                <a:spcPct val="90000"/>
+              </a:lnSpc>
+              <a:spcBef>
+                <a:spcPts val="600"/>
+              </a:spcBef>
+            </a:pPr>
+            <a:r>
+              <a:rPr lang="en-US" sz="2000" dirty="0" smtClean="0"/>
+              <a:t>Equities, </a:t>
+            </a:r>
+            <a:r>
+              <a:rPr lang="en-US" sz="2000" dirty="0" err="1" smtClean="0"/>
+              <a:t>esp</a:t>
+            </a:r>
+            <a:r>
+              <a:rPr lang="en-US" sz="2000" dirty="0" smtClean="0"/>
+              <a:t> emerging markets </a:t>
+            </a:r>
+          </a:p>
+          <a:p>
+            <a:pPr eaLnBrk="1" hangingPunct="1">
+              <a:spcBef>
+                <a:spcPts val="1200"/>
+              </a:spcBef>
+            </a:pPr>
+            <a:r>
+              <a:rPr lang="en-US" sz="2400" dirty="0" smtClean="0"/>
+              <a:t>Media and marketing </a:t>
+            </a:r>
+          </a:p>
+          <a:p>
+            <a:pPr lvl="1" eaLnBrk="1" hangingPunct="1">
+              <a:spcBef>
+                <a:spcPts val="1200"/>
+              </a:spcBef>
+            </a:pPr>
+            <a:r>
+              <a:rPr lang="en-US" sz="2000" dirty="0" smtClean="0"/>
+              <a:t>Not a focus, but they’re unusually cyclical businesses </a:t>
+            </a:r>
+          </a:p>
+          <a:p>
+            <a:pPr eaLnBrk="1" hangingPunct="1">
+              <a:spcBef>
+                <a:spcPts val="1200"/>
+              </a:spcBef>
+            </a:pPr>
+            <a:r>
+              <a:rPr lang="en-US" sz="2400" dirty="0" smtClean="0"/>
+              <a:t>Everyone else </a:t>
+            </a:r>
+          </a:p>
+          <a:p>
+            <a:pPr lvl="1" eaLnBrk="1" hangingPunct="1">
+              <a:spcBef>
+                <a:spcPts val="1200"/>
+              </a:spcBef>
+            </a:pPr>
+            <a:r>
+              <a:rPr lang="en-US" sz="2000" dirty="0" smtClean="0"/>
+              <a:t>Fact of life you’ll have to deal with  </a:t>
             </a:r>
           </a:p>
         </p:txBody>
@@ -4856,33 +5166,12 @@
           </a:p>
         </p:txBody>
       </p:sp>
-      <p:pic>
-        <p:nvPicPr>
-          <p:cNvPr id="111618" name="Picture 2" descr="FRED Graph"/>
-          <p:cNvPicPr>
-            <a:picLocks noChangeAspect="1" noChangeArrowheads="1"/>
-          </p:cNvPicPr>
-          <p:nvPr/>
-        </p:nvPicPr>
-        <p:blipFill>
-          <a:blip r:embed="rId2"/>
-          <a:srcRect/>
-          <a:stretch>
-            <a:fillRect/>
-          </a:stretch>
-        </p:blipFill>
-        <p:spPr bwMode="auto">
-          <a:xfrm>
-            <a:off x="787400" y="1428749"/>
-            <a:ext cx="7651750" cy="4591051"/>
-          </a:xfrm>
-          <a:prstGeom prst="rect">
-            <a:avLst/>
-          </a:prstGeom>
-          <a:noFill/>
-        </p:spPr>
-      </p:pic>
     </p:spTree>
+    <p:extLst>
+      <p:ext uri="{BB962C8B-B14F-4D97-AF65-F5344CB8AC3E}">
+        <p14:creationId xmlns:p14="http://schemas.microsoft.com/office/powerpoint/2010/main" val="3732232297"/>
+      </p:ext>
+    </p:extLst>
   </p:cSld>
   <p:clrMapOvr>
     <a:masterClrMapping/>
@@ -4916,12 +5205,12 @@
       </p:grpSpPr>
       <p:sp>
         <p:nvSpPr>
-          <p:cNvPr id="4098" name="Rectangle 2"/>
+          <p:cNvPr id="57346" name="Rectangle 4"/>
           <p:cNvSpPr>
             <a:spLocks noGrp="1" noChangeArrowheads="1"/>
           </p:cNvSpPr>
           <p:nvPr>
-            <p:ph type="title" idx="4294967295"/>
+            <p:ph type="ctrTitle"/>
           </p:nvPr>
         </p:nvSpPr>
         <p:spPr/>
@@ -4929,66 +5218,14 @@
           <a:bodyPr/>
           <a:lstStyle/>
           <a:p>
-            <a:pPr algn="l" eaLnBrk="1" hangingPunct="1"/>
-            <a:r>
-              <a:rPr lang="en-US" dirty="0" smtClean="0"/>
-              <a:t>US GDP (annual, growth rate)</a:t>
-            </a:r>
-          </a:p>
-        </p:txBody>
-      </p:sp>
-      <p:sp>
-        <p:nvSpPr>
-          <p:cNvPr id="4100" name="Slide Number Placeholder 3"/>
-          <p:cNvSpPr>
-            <a:spLocks noGrp="1"/>
-          </p:cNvSpPr>
-          <p:nvPr>
-            <p:ph type="sldNum" sz="quarter" idx="12"/>
-          </p:nvPr>
-        </p:nvSpPr>
-        <p:spPr>
-          <a:noFill/>
-        </p:spPr>
-        <p:txBody>
-          <a:bodyPr/>
-          <a:lstStyle/>
-          <a:p>
-            <a:fld id="{E041A9CD-8F68-446A-8192-3D8982304C37}" type="slidenum">
-              <a:rPr lang="en-US" smtClean="0"/>
-              <a:pPr/>
-              <a:t>12</a:t>
-            </a:fld>
-            <a:endParaRPr lang="en-US" smtClean="0"/>
-          </a:p>
-        </p:txBody>
-      </p:sp>
-      <p:pic>
-        <p:nvPicPr>
-          <p:cNvPr id="105474" name="Picture 2" descr="FRED Graph"/>
-          <p:cNvPicPr>
-            <a:picLocks noChangeAspect="1" noChangeArrowheads="1"/>
-          </p:cNvPicPr>
-          <p:nvPr/>
-        </p:nvPicPr>
-        <p:blipFill>
-          <a:blip r:embed="rId2"/>
-          <a:srcRect/>
-          <a:stretch>
-            <a:fillRect/>
-          </a:stretch>
-        </p:blipFill>
-        <p:spPr bwMode="auto">
-          <a:xfrm>
-            <a:off x="782782" y="1418358"/>
-            <a:ext cx="7651750" cy="4591051"/>
-          </a:xfrm>
-          <a:prstGeom prst="rect">
-            <a:avLst/>
-          </a:prstGeom>
-          <a:noFill/>
-        </p:spPr>
-      </p:pic>
+            <a:pPr eaLnBrk="1" hangingPunct="1"/>
+            <a:r>
+              <a:rPr lang="en-US" i="1" dirty="0" smtClean="0"/>
+              <a:t>Volatility</a:t>
+            </a:r>
+          </a:p>
+        </p:txBody>
+      </p:sp>
     </p:spTree>
   </p:cSld>
   <p:clrMapOvr>
@@ -5039,7 +5276,7 @@
             <a:pPr algn="l" eaLnBrk="1" hangingPunct="1"/>
             <a:r>
               <a:rPr lang="en-US" dirty="0" smtClean="0"/>
-              <a:t>US GDP (quarterly)</a:t>
+              <a:t>US GDP (annual)</a:t>
             </a:r>
           </a:p>
         </p:txBody>
@@ -5072,7 +5309,7 @@
       </p:sp>
       <p:pic>
         <p:nvPicPr>
-          <p:cNvPr id="106498" name="Picture 2" descr="FRED Graph"/>
+          <p:cNvPr id="111618" name="Picture 2" descr="FRED Graph"/>
           <p:cNvPicPr>
             <a:picLocks noChangeAspect="1" noChangeArrowheads="1"/>
           </p:cNvPicPr>
@@ -5087,7 +5324,7 @@
         </p:blipFill>
         <p:spPr bwMode="auto">
           <a:xfrm>
-            <a:off x="730250" y="1428749"/>
+            <a:off x="787400" y="1428749"/>
             <a:ext cx="7651750" cy="4591051"/>
           </a:xfrm>
           <a:prstGeom prst="rect">
@@ -5146,7 +5383,7 @@
             <a:pPr algn="l" eaLnBrk="1" hangingPunct="1"/>
             <a:r>
               <a:rPr lang="en-US" dirty="0" smtClean="0"/>
-              <a:t>US GDP (quarterly, growth rate) </a:t>
+              <a:t>US GDP (annual, growth rate)</a:t>
             </a:r>
           </a:p>
         </p:txBody>
@@ -5179,7 +5416,7 @@
       </p:sp>
       <p:pic>
         <p:nvPicPr>
-          <p:cNvPr id="151554" name="Picture 2" descr="FRED Graph"/>
+          <p:cNvPr id="105474" name="Picture 2" descr="FRED Graph"/>
           <p:cNvPicPr>
             <a:picLocks noChangeAspect="1" noChangeArrowheads="1"/>
           </p:cNvPicPr>
@@ -5194,8 +5431,8 @@
         </p:blipFill>
         <p:spPr bwMode="auto">
           <a:xfrm>
-            <a:off x="838200" y="1402080"/>
-            <a:ext cx="7543800" cy="4526281"/>
+            <a:off x="782782" y="1418358"/>
+            <a:ext cx="7651750" cy="4591051"/>
           </a:xfrm>
           <a:prstGeom prst="rect">
             <a:avLst/>
@@ -5237,6 +5474,220 @@
       </p:grpSpPr>
       <p:sp>
         <p:nvSpPr>
+          <p:cNvPr id="4098" name="Rectangle 2"/>
+          <p:cNvSpPr>
+            <a:spLocks noGrp="1" noChangeArrowheads="1"/>
+          </p:cNvSpPr>
+          <p:nvPr>
+            <p:ph type="title" idx="4294967295"/>
+          </p:nvPr>
+        </p:nvSpPr>
+        <p:spPr/>
+        <p:txBody>
+          <a:bodyPr/>
+          <a:lstStyle/>
+          <a:p>
+            <a:pPr algn="l" eaLnBrk="1" hangingPunct="1"/>
+            <a:r>
+              <a:rPr lang="en-US" dirty="0" smtClean="0"/>
+              <a:t>US GDP (quarterly)</a:t>
+            </a:r>
+          </a:p>
+        </p:txBody>
+      </p:sp>
+      <p:sp>
+        <p:nvSpPr>
+          <p:cNvPr id="4100" name="Slide Number Placeholder 3"/>
+          <p:cNvSpPr>
+            <a:spLocks noGrp="1"/>
+          </p:cNvSpPr>
+          <p:nvPr>
+            <p:ph type="sldNum" sz="quarter" idx="12"/>
+          </p:nvPr>
+        </p:nvSpPr>
+        <p:spPr>
+          <a:noFill/>
+        </p:spPr>
+        <p:txBody>
+          <a:bodyPr/>
+          <a:lstStyle/>
+          <a:p>
+            <a:fld id="{E041A9CD-8F68-446A-8192-3D8982304C37}" type="slidenum">
+              <a:rPr lang="en-US" smtClean="0"/>
+              <a:pPr/>
+              <a:t>15</a:t>
+            </a:fld>
+            <a:endParaRPr lang="en-US" smtClean="0"/>
+          </a:p>
+        </p:txBody>
+      </p:sp>
+      <p:pic>
+        <p:nvPicPr>
+          <p:cNvPr id="106498" name="Picture 2" descr="FRED Graph"/>
+          <p:cNvPicPr>
+            <a:picLocks noChangeAspect="1" noChangeArrowheads="1"/>
+          </p:cNvPicPr>
+          <p:nvPr/>
+        </p:nvPicPr>
+        <p:blipFill>
+          <a:blip r:embed="rId2"/>
+          <a:srcRect/>
+          <a:stretch>
+            <a:fillRect/>
+          </a:stretch>
+        </p:blipFill>
+        <p:spPr bwMode="auto">
+          <a:xfrm>
+            <a:off x="730250" y="1428749"/>
+            <a:ext cx="7651750" cy="4591051"/>
+          </a:xfrm>
+          <a:prstGeom prst="rect">
+            <a:avLst/>
+          </a:prstGeom>
+          <a:noFill/>
+        </p:spPr>
+      </p:pic>
+    </p:spTree>
+  </p:cSld>
+  <p:clrMapOvr>
+    <a:masterClrMapping/>
+  </p:clrMapOvr>
+  <p:timing>
+    <p:tnLst>
+      <p:par>
+        <p:cTn id="1" dur="indefinite" restart="never" nodeType="tmRoot"/>
+      </p:par>
+    </p:tnLst>
+  </p:timing>
+</p:sld>
+</file>
+
+<file path=ppt/slides/slide16.xml><?xml version="1.0" encoding="utf-8"?>
+<p:sld xmlns:a="http://schemas.openxmlformats.org/drawingml/2006/main" xmlns:r="http://schemas.openxmlformats.org/officeDocument/2006/relationships" xmlns:p="http://schemas.openxmlformats.org/presentationml/2006/main">
+  <p:cSld>
+    <p:spTree>
+      <p:nvGrpSpPr>
+        <p:cNvPr id="1" name=""/>
+        <p:cNvGrpSpPr/>
+        <p:nvPr/>
+      </p:nvGrpSpPr>
+      <p:grpSpPr>
+        <a:xfrm>
+          <a:off x="0" y="0"/>
+          <a:ext cx="0" cy="0"/>
+          <a:chOff x="0" y="0"/>
+          <a:chExt cx="0" cy="0"/>
+        </a:xfrm>
+      </p:grpSpPr>
+      <p:sp>
+        <p:nvSpPr>
+          <p:cNvPr id="4098" name="Rectangle 2"/>
+          <p:cNvSpPr>
+            <a:spLocks noGrp="1" noChangeArrowheads="1"/>
+          </p:cNvSpPr>
+          <p:nvPr>
+            <p:ph type="title" idx="4294967295"/>
+          </p:nvPr>
+        </p:nvSpPr>
+        <p:spPr/>
+        <p:txBody>
+          <a:bodyPr/>
+          <a:lstStyle/>
+          <a:p>
+            <a:pPr algn="l" eaLnBrk="1" hangingPunct="1"/>
+            <a:r>
+              <a:rPr lang="en-US" dirty="0" smtClean="0"/>
+              <a:t>US GDP (quarterly, growth rate) </a:t>
+            </a:r>
+          </a:p>
+        </p:txBody>
+      </p:sp>
+      <p:sp>
+        <p:nvSpPr>
+          <p:cNvPr id="4100" name="Slide Number Placeholder 3"/>
+          <p:cNvSpPr>
+            <a:spLocks noGrp="1"/>
+          </p:cNvSpPr>
+          <p:nvPr>
+            <p:ph type="sldNum" sz="quarter" idx="12"/>
+          </p:nvPr>
+        </p:nvSpPr>
+        <p:spPr>
+          <a:noFill/>
+        </p:spPr>
+        <p:txBody>
+          <a:bodyPr/>
+          <a:lstStyle/>
+          <a:p>
+            <a:fld id="{E041A9CD-8F68-446A-8192-3D8982304C37}" type="slidenum">
+              <a:rPr lang="en-US" smtClean="0"/>
+              <a:pPr/>
+              <a:t>16</a:t>
+            </a:fld>
+            <a:endParaRPr lang="en-US" smtClean="0"/>
+          </a:p>
+        </p:txBody>
+      </p:sp>
+      <p:pic>
+        <p:nvPicPr>
+          <p:cNvPr id="151554" name="Picture 2" descr="FRED Graph"/>
+          <p:cNvPicPr>
+            <a:picLocks noChangeAspect="1" noChangeArrowheads="1"/>
+          </p:cNvPicPr>
+          <p:nvPr/>
+        </p:nvPicPr>
+        <p:blipFill>
+          <a:blip r:embed="rId2"/>
+          <a:srcRect/>
+          <a:stretch>
+            <a:fillRect/>
+          </a:stretch>
+        </p:blipFill>
+        <p:spPr bwMode="auto">
+          <a:xfrm>
+            <a:off x="838200" y="1402080"/>
+            <a:ext cx="7543800" cy="4526281"/>
+          </a:xfrm>
+          <a:prstGeom prst="rect">
+            <a:avLst/>
+          </a:prstGeom>
+          <a:noFill/>
+        </p:spPr>
+      </p:pic>
+    </p:spTree>
+  </p:cSld>
+  <p:clrMapOvr>
+    <a:masterClrMapping/>
+  </p:clrMapOvr>
+  <p:timing>
+    <p:tnLst>
+      <p:par>
+        <p:cTn id="1" dur="indefinite" restart="never" nodeType="tmRoot"/>
+      </p:par>
+    </p:tnLst>
+  </p:timing>
+</p:sld>
+</file>
+
+<file path=ppt/slides/slide17.xml><?xml version="1.0" encoding="utf-8"?>
+<p:sld xmlns:a="http://schemas.openxmlformats.org/drawingml/2006/main" xmlns:r="http://schemas.openxmlformats.org/officeDocument/2006/relationships" xmlns:p="http://schemas.openxmlformats.org/presentationml/2006/main">
+  <p:cSld>
+    <p:spTree>
+      <p:nvGrpSpPr>
+        <p:cNvPr id="1" name=""/>
+        <p:cNvGrpSpPr/>
+        <p:nvPr/>
+      </p:nvGrpSpPr>
+      <p:grpSpPr>
+        <a:xfrm>
+          <a:off x="0" y="0"/>
+          <a:ext cx="0" cy="0"/>
+          <a:chOff x="0" y="0"/>
+          <a:chExt cx="0" cy="0"/>
+        </a:xfrm>
+      </p:grpSpPr>
+      <p:sp>
+        <p:nvSpPr>
           <p:cNvPr id="16386" name="Rectangle 2"/>
           <p:cNvSpPr>
             <a:spLocks noGrp="1" noChangeArrowheads="1"/>
@@ -5279,7 +5730,7 @@
             <a:fld id="{5A6C9C06-592F-4295-A509-527009130F27}" type="slidenum">
               <a:rPr lang="en-US" smtClean="0"/>
               <a:pPr/>
-              <a:t>15</a:t>
+              <a:t>17</a:t>
             </a:fld>
             <a:endParaRPr lang="en-US" smtClean="0"/>
           </a:p>
@@ -5339,7 +5790,7 @@
           <a:graphicData uri="http://schemas.openxmlformats.org/presentationml/2006/ole">
             <mc:AlternateContent xmlns:mc="http://schemas.openxmlformats.org/markup-compatibility/2006">
               <mc:Choice xmlns:v="urn:schemas-microsoft-com:vml" Requires="v">
-                <p:oleObj spid="_x0000_s119817" name="Chart" r:id="rId3" imgW="8221982" imgH="4533954" progId="MSGraph.Chart.8">
+                <p:oleObj spid="_x0000_s119832" name="Chart" r:id="rId3" imgW="8221982" imgH="4533954" progId="MSGraph.Chart.8">
                   <p:embed followColorScheme="full"/>
                 </p:oleObj>
               </mc:Choice>
@@ -5408,7 +5859,7 @@
 </p:sld>
 </file>
 
-<file path=ppt/slides/slide16.xml><?xml version="1.0" encoding="utf-8"?>
+<file path=ppt/slides/slide18.xml><?xml version="1.0" encoding="utf-8"?>
 <p:sld xmlns:a="http://schemas.openxmlformats.org/drawingml/2006/main" xmlns:r="http://schemas.openxmlformats.org/officeDocument/2006/relationships" xmlns:p="http://schemas.openxmlformats.org/presentationml/2006/main">
   <p:cSld>
     <p:spTree>
@@ -5474,7 +5925,7 @@
             <a:fld id="{5A6C9C06-592F-4295-A509-527009130F27}" type="slidenum">
               <a:rPr lang="en-US" smtClean="0"/>
               <a:pPr/>
-              <a:t>16</a:t>
+              <a:t>18</a:t>
             </a:fld>
             <a:endParaRPr lang="en-US" smtClean="0"/>
           </a:p>
@@ -5534,7 +5985,7 @@
           <a:graphicData uri="http://schemas.openxmlformats.org/presentationml/2006/ole">
             <mc:AlternateContent xmlns:mc="http://schemas.openxmlformats.org/markup-compatibility/2006">
               <mc:Choice xmlns:v="urn:schemas-microsoft-com:vml" Requires="v">
-                <p:oleObj spid="_x0000_s120841" name="Chart" r:id="rId3" imgW="8221982" imgH="4533954" progId="MSGraph.Chart.8">
+                <p:oleObj spid="_x0000_s120856" name="Chart" r:id="rId3" imgW="8221982" imgH="4533954" progId="MSGraph.Chart.8">
                   <p:embed followColorScheme="full"/>
                 </p:oleObj>
               </mc:Choice>
@@ -5603,196 +6054,6 @@
 </p:sld>
 </file>
 
-<file path=ppt/slides/slide17.xml><?xml version="1.0" encoding="utf-8"?>
-<p:sld xmlns:a="http://schemas.openxmlformats.org/drawingml/2006/main" xmlns:r="http://schemas.openxmlformats.org/officeDocument/2006/relationships" xmlns:p="http://schemas.openxmlformats.org/presentationml/2006/main">
-  <p:cSld>
-    <p:spTree>
-      <p:nvGrpSpPr>
-        <p:cNvPr id="1" name=""/>
-        <p:cNvGrpSpPr/>
-        <p:nvPr/>
-      </p:nvGrpSpPr>
-      <p:grpSpPr>
-        <a:xfrm>
-          <a:off x="0" y="0"/>
-          <a:ext cx="0" cy="0"/>
-          <a:chOff x="0" y="0"/>
-          <a:chExt cx="0" cy="0"/>
-        </a:xfrm>
-      </p:grpSpPr>
-      <p:sp>
-        <p:nvSpPr>
-          <p:cNvPr id="57346" name="Rectangle 4"/>
-          <p:cNvSpPr>
-            <a:spLocks noGrp="1" noChangeArrowheads="1"/>
-          </p:cNvSpPr>
-          <p:nvPr>
-            <p:ph type="ctrTitle"/>
-          </p:nvPr>
-        </p:nvSpPr>
-        <p:spPr/>
-        <p:txBody>
-          <a:bodyPr/>
-          <a:lstStyle/>
-          <a:p>
-            <a:pPr eaLnBrk="1" hangingPunct="1"/>
-            <a:r>
-              <a:rPr lang="en-US" i="1" dirty="0" smtClean="0"/>
-              <a:t>Mercedes-Benz USA</a:t>
-            </a:r>
-          </a:p>
-        </p:txBody>
-      </p:sp>
-    </p:spTree>
-  </p:cSld>
-  <p:clrMapOvr>
-    <a:masterClrMapping/>
-  </p:clrMapOvr>
-  <p:timing>
-    <p:tnLst>
-      <p:par>
-        <p:cTn id="1" dur="indefinite" restart="never" nodeType="tmRoot"/>
-      </p:par>
-    </p:tnLst>
-  </p:timing>
-</p:sld>
-</file>
-
-<file path=ppt/slides/slide18.xml><?xml version="1.0" encoding="utf-8"?>
-<p:sld xmlns:a="http://schemas.openxmlformats.org/drawingml/2006/main" xmlns:r="http://schemas.openxmlformats.org/officeDocument/2006/relationships" xmlns:p="http://schemas.openxmlformats.org/presentationml/2006/main">
-  <p:cSld>
-    <p:spTree>
-      <p:nvGrpSpPr>
-        <p:cNvPr id="1" name=""/>
-        <p:cNvGrpSpPr/>
-        <p:nvPr/>
-      </p:nvGrpSpPr>
-      <p:grpSpPr>
-        <a:xfrm>
-          <a:off x="0" y="0"/>
-          <a:ext cx="0" cy="0"/>
-          <a:chOff x="0" y="0"/>
-          <a:chExt cx="0" cy="0"/>
-        </a:xfrm>
-      </p:grpSpPr>
-      <p:sp>
-        <p:nvSpPr>
-          <p:cNvPr id="4098" name="Rectangle 2"/>
-          <p:cNvSpPr>
-            <a:spLocks noGrp="1" noChangeArrowheads="1"/>
-          </p:cNvSpPr>
-          <p:nvPr>
-            <p:ph type="title" idx="4294967295"/>
-          </p:nvPr>
-        </p:nvSpPr>
-        <p:spPr/>
-        <p:txBody>
-          <a:bodyPr/>
-          <a:lstStyle/>
-          <a:p>
-            <a:pPr algn="l" eaLnBrk="1" hangingPunct="1"/>
-            <a:r>
-              <a:rPr lang="en-US" dirty="0" smtClean="0"/>
-              <a:t>Mercedes-Benz USA </a:t>
-            </a:r>
-          </a:p>
-        </p:txBody>
-      </p:sp>
-      <p:sp>
-        <p:nvSpPr>
-          <p:cNvPr id="4099" name="Rectangle 3"/>
-          <p:cNvSpPr>
-            <a:spLocks noGrp="1" noChangeArrowheads="1"/>
-          </p:cNvSpPr>
-          <p:nvPr>
-            <p:ph type="body" idx="4294967295"/>
-          </p:nvPr>
-        </p:nvSpPr>
-        <p:spPr/>
-        <p:txBody>
-          <a:bodyPr/>
-          <a:lstStyle/>
-          <a:p>
-            <a:pPr eaLnBrk="1" hangingPunct="1">
-              <a:spcBef>
-                <a:spcPts val="1200"/>
-              </a:spcBef>
-            </a:pPr>
-            <a:r>
-              <a:rPr lang="en-US" sz="2400" dirty="0" smtClean="0"/>
-              <a:t>How cyclical is their business?</a:t>
-            </a:r>
-          </a:p>
-          <a:p>
-            <a:pPr eaLnBrk="1" hangingPunct="1">
-              <a:spcBef>
-                <a:spcPts val="1200"/>
-              </a:spcBef>
-            </a:pPr>
-            <a:r>
-              <a:rPr lang="en-US" sz="2400" dirty="0" smtClean="0"/>
-              <a:t>Why?</a:t>
-            </a:r>
-          </a:p>
-          <a:p>
-            <a:pPr eaLnBrk="1" hangingPunct="1">
-              <a:spcBef>
-                <a:spcPts val="1200"/>
-              </a:spcBef>
-            </a:pPr>
-            <a:r>
-              <a:rPr lang="en-US" sz="2400" dirty="0" smtClean="0"/>
-              <a:t>What should they do to deal with it</a:t>
-            </a:r>
-            <a:r>
-              <a:rPr lang="en-US" sz="2400" smtClean="0"/>
-              <a:t>?  </a:t>
-            </a:r>
-            <a:endParaRPr lang="en-US" sz="2400" dirty="0" smtClean="0"/>
-          </a:p>
-        </p:txBody>
-      </p:sp>
-      <p:sp>
-        <p:nvSpPr>
-          <p:cNvPr id="4100" name="Slide Number Placeholder 3"/>
-          <p:cNvSpPr>
-            <a:spLocks noGrp="1"/>
-          </p:cNvSpPr>
-          <p:nvPr>
-            <p:ph type="sldNum" sz="quarter" idx="12"/>
-          </p:nvPr>
-        </p:nvSpPr>
-        <p:spPr>
-          <a:noFill/>
-        </p:spPr>
-        <p:txBody>
-          <a:bodyPr/>
-          <a:lstStyle/>
-          <a:p>
-            <a:fld id="{E041A9CD-8F68-446A-8192-3D8982304C37}" type="slidenum">
-              <a:rPr lang="en-US" smtClean="0"/>
-              <a:pPr/>
-              <a:t>18</a:t>
-            </a:fld>
-            <a:endParaRPr lang="en-US" smtClean="0"/>
-          </a:p>
-        </p:txBody>
-      </p:sp>
-    </p:spTree>
-  </p:cSld>
-  <p:clrMapOvr>
-    <a:masterClrMapping/>
-  </p:clrMapOvr>
-  <p:timing>
-    <p:tnLst>
-      <p:par>
-        <p:cTn id="1" dur="indefinite" restart="never" nodeType="tmRoot"/>
-      </p:par>
-    </p:tnLst>
-  </p:timing>
-</p:sld>
-</file>
-
 <file path=ppt/slides/slide19.xml><?xml version="1.0" encoding="utf-8"?>
 <p:sld xmlns:a="http://schemas.openxmlformats.org/drawingml/2006/main" xmlns:r="http://schemas.openxmlformats.org/officeDocument/2006/relationships" xmlns:p="http://schemas.openxmlformats.org/presentationml/2006/main">
   <p:cSld>
@@ -5828,7 +6089,7 @@
             <a:pPr eaLnBrk="1" hangingPunct="1"/>
             <a:r>
               <a:rPr lang="en-US" i="1" dirty="0" smtClean="0"/>
-              <a:t>Business cycle properties</a:t>
+              <a:t>Mercedes-Benz USA</a:t>
             </a:r>
           </a:p>
         </p:txBody>
@@ -5997,8 +6258,62 @@
             <a:pPr algn="l" eaLnBrk="1" hangingPunct="1"/>
             <a:r>
               <a:rPr lang="en-US" dirty="0" smtClean="0"/>
-              <a:t>Consumption</a:t>
-            </a:r>
+              <a:t>Mercedes-Benz USA </a:t>
+            </a:r>
+          </a:p>
+        </p:txBody>
+      </p:sp>
+      <p:sp>
+        <p:nvSpPr>
+          <p:cNvPr id="4099" name="Rectangle 3"/>
+          <p:cNvSpPr>
+            <a:spLocks noGrp="1" noChangeArrowheads="1"/>
+          </p:cNvSpPr>
+          <p:nvPr>
+            <p:ph type="body" idx="4294967295"/>
+          </p:nvPr>
+        </p:nvSpPr>
+        <p:spPr/>
+        <p:txBody>
+          <a:bodyPr/>
+          <a:lstStyle/>
+          <a:p>
+            <a:pPr eaLnBrk="1" hangingPunct="1">
+              <a:spcBef>
+                <a:spcPts val="1200"/>
+              </a:spcBef>
+            </a:pPr>
+            <a:r>
+              <a:rPr lang="en-US" sz="2400" dirty="0" smtClean="0"/>
+              <a:t>How cyclical is their business?</a:t>
+            </a:r>
+          </a:p>
+          <a:p>
+            <a:pPr eaLnBrk="1" hangingPunct="1">
+              <a:spcBef>
+                <a:spcPts val="1200"/>
+              </a:spcBef>
+            </a:pPr>
+            <a:r>
+              <a:rPr lang="en-US" sz="2400" dirty="0" smtClean="0"/>
+              <a:t>Why?</a:t>
+            </a:r>
+          </a:p>
+          <a:p>
+            <a:pPr eaLnBrk="1" hangingPunct="1">
+              <a:spcBef>
+                <a:spcPts val="1200"/>
+              </a:spcBef>
+            </a:pPr>
+            <a:r>
+              <a:rPr lang="en-US" sz="2400" dirty="0" smtClean="0"/>
+              <a:t>What should they do to deal with it</a:t>
+            </a:r>
+            <a:r>
+              <a:rPr lang="en-US" sz="2400" smtClean="0"/>
+              <a:t>?  </a:t>
+            </a:r>
+            <a:endParaRPr lang="en-US" sz="2400" dirty="0" smtClean="0"/>
           </a:p>
         </p:txBody>
       </p:sp>
@@ -6028,32 +6343,6 @@
           </a:p>
         </p:txBody>
       </p:sp>
-      <p:pic>
-        <p:nvPicPr>
-          <p:cNvPr id="131074" name="Picture 2" descr="FRED Graph"/>
-          <p:cNvPicPr>
-            <a:picLocks noChangeAspect="1" noChangeArrowheads="1"/>
-          </p:cNvPicPr>
-          <p:nvPr/>
-        </p:nvPicPr>
-        <p:blipFill>
-          <a:blip r:embed="rId2"/>
-          <a:srcRect/>
-          <a:stretch>
-            <a:fillRect/>
-          </a:stretch>
-        </p:blipFill>
-        <p:spPr bwMode="auto">
-          <a:xfrm>
-            <a:off x="685800" y="1352549"/>
-            <a:ext cx="7778750" cy="4667251"/>
-          </a:xfrm>
-          <a:prstGeom prst="rect">
-            <a:avLst/>
-          </a:prstGeom>
-          <a:noFill/>
-        </p:spPr>
-      </p:pic>
     </p:spTree>
   </p:cSld>
   <p:clrMapOvr>
@@ -6088,12 +6377,12 @@
       </p:grpSpPr>
       <p:sp>
         <p:nvSpPr>
-          <p:cNvPr id="4098" name="Rectangle 2"/>
+          <p:cNvPr id="57346" name="Rectangle 4"/>
           <p:cNvSpPr>
             <a:spLocks noGrp="1" noChangeArrowheads="1"/>
           </p:cNvSpPr>
           <p:nvPr>
-            <p:ph type="title" idx="4294967295"/>
+            <p:ph type="ctrTitle"/>
           </p:nvPr>
         </p:nvSpPr>
         <p:spPr/>
@@ -6101,66 +6390,14 @@
           <a:bodyPr/>
           <a:lstStyle/>
           <a:p>
-            <a:pPr algn="l" eaLnBrk="1" hangingPunct="1"/>
-            <a:r>
-              <a:rPr lang="en-US" dirty="0" smtClean="0"/>
-              <a:t>Private investment</a:t>
-            </a:r>
-          </a:p>
-        </p:txBody>
-      </p:sp>
-      <p:sp>
-        <p:nvSpPr>
-          <p:cNvPr id="4100" name="Slide Number Placeholder 3"/>
-          <p:cNvSpPr>
-            <a:spLocks noGrp="1"/>
-          </p:cNvSpPr>
-          <p:nvPr>
-            <p:ph type="sldNum" sz="quarter" idx="12"/>
-          </p:nvPr>
-        </p:nvSpPr>
-        <p:spPr>
-          <a:noFill/>
-        </p:spPr>
-        <p:txBody>
-          <a:bodyPr/>
-          <a:lstStyle/>
-          <a:p>
-            <a:fld id="{E041A9CD-8F68-446A-8192-3D8982304C37}" type="slidenum">
-              <a:rPr lang="en-US" smtClean="0"/>
-              <a:pPr/>
-              <a:t>21</a:t>
-            </a:fld>
-            <a:endParaRPr lang="en-US" smtClean="0"/>
-          </a:p>
-        </p:txBody>
-      </p:sp>
-      <p:pic>
-        <p:nvPicPr>
-          <p:cNvPr id="125956" name="Picture 4" descr="FRED Graph"/>
-          <p:cNvPicPr>
-            <a:picLocks noChangeAspect="1" noChangeArrowheads="1"/>
-          </p:cNvPicPr>
-          <p:nvPr/>
-        </p:nvPicPr>
-        <p:blipFill>
-          <a:blip r:embed="rId2"/>
-          <a:srcRect/>
-          <a:stretch>
-            <a:fillRect/>
-          </a:stretch>
-        </p:blipFill>
-        <p:spPr bwMode="auto">
-          <a:xfrm>
-            <a:off x="696191" y="1316182"/>
-            <a:ext cx="7778749" cy="4667251"/>
-          </a:xfrm>
-          <a:prstGeom prst="rect">
-            <a:avLst/>
-          </a:prstGeom>
-          <a:noFill/>
-        </p:spPr>
-      </p:pic>
+            <a:pPr eaLnBrk="1" hangingPunct="1"/>
+            <a:r>
+              <a:rPr lang="en-US" i="1" dirty="0" smtClean="0"/>
+              <a:t>Business cycle properties</a:t>
+            </a:r>
+          </a:p>
+        </p:txBody>
+      </p:sp>
     </p:spTree>
   </p:cSld>
   <p:clrMapOvr>
@@ -6211,7 +6448,45 @@
             <a:pPr algn="l" eaLnBrk="1" hangingPunct="1"/>
             <a:r>
               <a:rPr lang="en-US" dirty="0" smtClean="0"/>
-              <a:t>Change in inventories</a:t>
+              <a:t>Business cycle properties</a:t>
+            </a:r>
+          </a:p>
+        </p:txBody>
+      </p:sp>
+      <p:sp>
+        <p:nvSpPr>
+          <p:cNvPr id="4099" name="Rectangle 3"/>
+          <p:cNvSpPr>
+            <a:spLocks noGrp="1" noChangeArrowheads="1"/>
+          </p:cNvSpPr>
+          <p:nvPr>
+            <p:ph type="body" idx="4294967295"/>
+          </p:nvPr>
+        </p:nvSpPr>
+        <p:spPr/>
+        <p:txBody>
+          <a:bodyPr/>
+          <a:lstStyle/>
+          <a:p>
+            <a:pPr eaLnBrk="1" hangingPunct="1">
+              <a:spcBef>
+                <a:spcPts val="1200"/>
+              </a:spcBef>
+            </a:pPr>
+            <a:r>
+              <a:rPr lang="en-US" sz="2400" dirty="0" smtClean="0"/>
+              <a:t>Some things are more cyclical than others</a:t>
+            </a:r>
+          </a:p>
+          <a:p>
+            <a:pPr eaLnBrk="1" hangingPunct="1">
+              <a:spcBef>
+                <a:spcPts val="1200"/>
+              </a:spcBef>
+            </a:pPr>
+            <a:r>
+              <a:rPr lang="en-US" sz="2400" dirty="0" smtClean="0"/>
+              <a:t>Which ones?  </a:t>
             </a:r>
           </a:p>
         </p:txBody>
@@ -6242,33 +6517,12 @@
           </a:p>
         </p:txBody>
       </p:sp>
-      <p:pic>
-        <p:nvPicPr>
-          <p:cNvPr id="146434" name="Picture 2" descr="FRED Graph"/>
-          <p:cNvPicPr>
-            <a:picLocks noChangeAspect="1" noChangeArrowheads="1"/>
-          </p:cNvPicPr>
-          <p:nvPr/>
-        </p:nvPicPr>
-        <p:blipFill>
-          <a:blip r:embed="rId2"/>
-          <a:srcRect/>
-          <a:stretch>
-            <a:fillRect/>
-          </a:stretch>
-        </p:blipFill>
-        <p:spPr bwMode="auto">
-          <a:xfrm>
-            <a:off x="685800" y="1295400"/>
-            <a:ext cx="7905750" cy="4743451"/>
-          </a:xfrm>
-          <a:prstGeom prst="rect">
-            <a:avLst/>
-          </a:prstGeom>
-          <a:noFill/>
-        </p:spPr>
-      </p:pic>
     </p:spTree>
+    <p:extLst>
+      <p:ext uri="{BB962C8B-B14F-4D97-AF65-F5344CB8AC3E}">
+        <p14:creationId xmlns:p14="http://schemas.microsoft.com/office/powerpoint/2010/main" val="2635217425"/>
+      </p:ext>
+    </p:extLst>
   </p:cSld>
   <p:clrMapOvr>
     <a:masterClrMapping/>
@@ -6318,7 +6572,7 @@
             <a:pPr algn="l" eaLnBrk="1" hangingPunct="1"/>
             <a:r>
               <a:rPr lang="en-US" dirty="0" smtClean="0"/>
-              <a:t>Consumption:  nondurable goods</a:t>
+              <a:t>Consumption</a:t>
             </a:r>
           </a:p>
         </p:txBody>
@@ -6351,7 +6605,7 @@
       </p:sp>
       <p:pic>
         <p:nvPicPr>
-          <p:cNvPr id="140290" name="Picture 2" descr="FRED Graph"/>
+          <p:cNvPr id="131074" name="Picture 2" descr="FRED Graph"/>
           <p:cNvPicPr>
             <a:picLocks noChangeAspect="1" noChangeArrowheads="1"/>
           </p:cNvPicPr>
@@ -6366,8 +6620,8 @@
         </p:blipFill>
         <p:spPr bwMode="auto">
           <a:xfrm>
-            <a:off x="685800" y="1295400"/>
-            <a:ext cx="7905750" cy="4743451"/>
+            <a:off x="685800" y="1352549"/>
+            <a:ext cx="7778750" cy="4667251"/>
           </a:xfrm>
           <a:prstGeom prst="rect">
             <a:avLst/>
@@ -6425,7 +6679,7 @@
             <a:pPr algn="l" eaLnBrk="1" hangingPunct="1"/>
             <a:r>
               <a:rPr lang="en-US" dirty="0" smtClean="0"/>
-              <a:t>Consumption:  services</a:t>
+              <a:t>Private investment</a:t>
             </a:r>
           </a:p>
         </p:txBody>
@@ -6458,7 +6712,7 @@
       </p:sp>
       <p:pic>
         <p:nvPicPr>
-          <p:cNvPr id="141314" name="Picture 2" descr="FRED Graph"/>
+          <p:cNvPr id="125956" name="Picture 4" descr="FRED Graph"/>
           <p:cNvPicPr>
             <a:picLocks noChangeAspect="1" noChangeArrowheads="1"/>
           </p:cNvPicPr>
@@ -6473,8 +6727,8 @@
         </p:blipFill>
         <p:spPr bwMode="auto">
           <a:xfrm>
-            <a:off x="685800" y="1295400"/>
-            <a:ext cx="7905750" cy="4743451"/>
+            <a:off x="696191" y="1316182"/>
+            <a:ext cx="7778749" cy="4667251"/>
           </a:xfrm>
           <a:prstGeom prst="rect">
             <a:avLst/>
@@ -6532,7 +6786,7 @@
             <a:pPr algn="l" eaLnBrk="1" hangingPunct="1"/>
             <a:r>
               <a:rPr lang="en-US" dirty="0" smtClean="0"/>
-              <a:t>Consumption:  durable goods</a:t>
+              <a:t>Change in inventories</a:t>
             </a:r>
           </a:p>
         </p:txBody>
@@ -6565,7 +6819,7 @@
       </p:sp>
       <p:pic>
         <p:nvPicPr>
-          <p:cNvPr id="124930" name="Picture 2" descr="FRED Graph"/>
+          <p:cNvPr id="146434" name="Picture 2" descr="FRED Graph"/>
           <p:cNvPicPr>
             <a:picLocks noChangeAspect="1" noChangeArrowheads="1"/>
           </p:cNvPicPr>
@@ -6580,8 +6834,8 @@
         </p:blipFill>
         <p:spPr bwMode="auto">
           <a:xfrm>
-            <a:off x="704851" y="1295400"/>
-            <a:ext cx="7905749" cy="4743451"/>
+            <a:off x="685800" y="1295400"/>
+            <a:ext cx="7905750" cy="4743451"/>
           </a:xfrm>
           <a:prstGeom prst="rect">
             <a:avLst/>
@@ -6639,7 +6893,7 @@
             <a:pPr algn="l" eaLnBrk="1" hangingPunct="1"/>
             <a:r>
               <a:rPr lang="en-US" dirty="0" smtClean="0"/>
-              <a:t>Investment:  equipment &amp; software</a:t>
+              <a:t>Consumption:  nondurable goods</a:t>
             </a:r>
           </a:p>
         </p:txBody>
@@ -6672,7 +6926,7 @@
       </p:sp>
       <p:pic>
         <p:nvPicPr>
-          <p:cNvPr id="123906" name="Picture 2" descr="FRED Graph"/>
+          <p:cNvPr id="140290" name="Picture 2" descr="FRED Graph"/>
           <p:cNvPicPr>
             <a:picLocks noChangeAspect="1" noChangeArrowheads="1"/>
           </p:cNvPicPr>
@@ -6687,8 +6941,8 @@
         </p:blipFill>
         <p:spPr bwMode="auto">
           <a:xfrm>
-            <a:off x="710045" y="1321376"/>
-            <a:ext cx="7845137" cy="4707084"/>
+            <a:off x="685800" y="1295400"/>
+            <a:ext cx="7905750" cy="4743451"/>
           </a:xfrm>
           <a:prstGeom prst="rect">
             <a:avLst/>
@@ -6746,7 +7000,7 @@
             <a:pPr algn="l" eaLnBrk="1" hangingPunct="1"/>
             <a:r>
               <a:rPr lang="en-US" dirty="0" smtClean="0"/>
-              <a:t>Investment:  housing	</a:t>
+              <a:t>Consumption:  services</a:t>
             </a:r>
           </a:p>
         </p:txBody>
@@ -6779,7 +7033,7 @@
       </p:sp>
       <p:pic>
         <p:nvPicPr>
-          <p:cNvPr id="145410" name="Picture 2" descr="FRED Graph"/>
+          <p:cNvPr id="141314" name="Picture 2" descr="FRED Graph"/>
           <p:cNvPicPr>
             <a:picLocks noChangeAspect="1" noChangeArrowheads="1"/>
           </p:cNvPicPr>
@@ -6794,8 +7048,8 @@
         </p:blipFill>
         <p:spPr bwMode="auto">
           <a:xfrm>
-            <a:off x="654051" y="1276349"/>
-            <a:ext cx="8032749" cy="4819651"/>
+            <a:off x="685800" y="1295400"/>
+            <a:ext cx="7905750" cy="4743451"/>
           </a:xfrm>
           <a:prstGeom prst="rect">
             <a:avLst/>
@@ -6853,7 +7107,7 @@
             <a:pPr algn="l" eaLnBrk="1" hangingPunct="1"/>
             <a:r>
               <a:rPr lang="en-US" dirty="0" smtClean="0"/>
-              <a:t>Employment</a:t>
+              <a:t>Consumption:  durable goods</a:t>
             </a:r>
           </a:p>
         </p:txBody>
@@ -6886,7 +7140,7 @@
       </p:sp>
       <p:pic>
         <p:nvPicPr>
-          <p:cNvPr id="144386" name="Picture 2" descr="FRED Graph"/>
+          <p:cNvPr id="124930" name="Picture 2" descr="FRED Graph"/>
           <p:cNvPicPr>
             <a:picLocks noChangeAspect="1" noChangeArrowheads="1"/>
           </p:cNvPicPr>
@@ -6901,7 +7155,7 @@
         </p:blipFill>
         <p:spPr bwMode="auto">
           <a:xfrm>
-            <a:off x="685800" y="1295400"/>
+            <a:off x="704851" y="1295400"/>
             <a:ext cx="7905749" cy="4743451"/>
           </a:xfrm>
           <a:prstGeom prst="rect">
@@ -6960,7 +7214,7 @@
             <a:pPr algn="l" eaLnBrk="1" hangingPunct="1"/>
             <a:r>
               <a:rPr lang="en-US" dirty="0" smtClean="0"/>
-              <a:t>S&amp;P 500</a:t>
+              <a:t>Investment:  equipment &amp; software</a:t>
             </a:r>
           </a:p>
         </p:txBody>
@@ -6993,7 +7247,7 @@
       </p:sp>
       <p:pic>
         <p:nvPicPr>
-          <p:cNvPr id="143362" name="Picture 2" descr="FRED Graph"/>
+          <p:cNvPr id="123906" name="Picture 2" descr="FRED Graph"/>
           <p:cNvPicPr>
             <a:picLocks noChangeAspect="1" noChangeArrowheads="1"/>
           </p:cNvPicPr>
@@ -7008,8 +7262,8 @@
         </p:blipFill>
         <p:spPr bwMode="auto">
           <a:xfrm>
-            <a:off x="679450" y="1295401"/>
-            <a:ext cx="7873998" cy="4724400"/>
+            <a:off x="710045" y="1321376"/>
+            <a:ext cx="7845137" cy="4707084"/>
           </a:xfrm>
           <a:prstGeom prst="rect">
             <a:avLst/>
@@ -7184,12 +7438,12 @@
       </p:grpSpPr>
       <p:sp>
         <p:nvSpPr>
-          <p:cNvPr id="57346" name="Rectangle 4"/>
+          <p:cNvPr id="4098" name="Rectangle 2"/>
           <p:cNvSpPr>
             <a:spLocks noGrp="1" noChangeArrowheads="1"/>
           </p:cNvSpPr>
           <p:nvPr>
-            <p:ph type="ctrTitle"/>
+            <p:ph type="title" idx="4294967295"/>
           </p:nvPr>
         </p:nvSpPr>
         <p:spPr/>
@@ -7197,22 +7451,66 @@
           <a:bodyPr/>
           <a:lstStyle/>
           <a:p>
-            <a:pPr eaLnBrk="1" hangingPunct="1"/>
-            <a:r>
-              <a:rPr lang="en-US" i="1" dirty="0" smtClean="0"/>
-              <a:t>What’s </a:t>
-            </a:r>
-            <a:r>
-              <a:rPr lang="en-US" i="1" smtClean="0"/>
-              <a:t>more cyclical</a:t>
-            </a:r>
-            <a:r>
-              <a:rPr lang="en-US" i="1" dirty="0" smtClean="0"/>
-              <a:t>?</a:t>
-            </a:r>
-          </a:p>
-        </p:txBody>
-      </p:sp>
+            <a:pPr algn="l" eaLnBrk="1" hangingPunct="1"/>
+            <a:r>
+              <a:rPr lang="en-US" dirty="0" smtClean="0"/>
+              <a:t>Investment:  housing	</a:t>
+            </a:r>
+          </a:p>
+        </p:txBody>
+      </p:sp>
+      <p:sp>
+        <p:nvSpPr>
+          <p:cNvPr id="4100" name="Slide Number Placeholder 3"/>
+          <p:cNvSpPr>
+            <a:spLocks noGrp="1"/>
+          </p:cNvSpPr>
+          <p:nvPr>
+            <p:ph type="sldNum" sz="quarter" idx="12"/>
+          </p:nvPr>
+        </p:nvSpPr>
+        <p:spPr>
+          <a:noFill/>
+        </p:spPr>
+        <p:txBody>
+          <a:bodyPr/>
+          <a:lstStyle/>
+          <a:p>
+            <a:fld id="{E041A9CD-8F68-446A-8192-3D8982304C37}" type="slidenum">
+              <a:rPr lang="en-US" smtClean="0"/>
+              <a:pPr/>
+              <a:t>30</a:t>
+            </a:fld>
+            <a:endParaRPr lang="en-US" smtClean="0"/>
+          </a:p>
+        </p:txBody>
+      </p:sp>
+      <p:pic>
+        <p:nvPicPr>
+          <p:cNvPr id="145410" name="Picture 2" descr="FRED Graph"/>
+          <p:cNvPicPr>
+            <a:picLocks noChangeAspect="1" noChangeArrowheads="1"/>
+          </p:cNvPicPr>
+          <p:nvPr/>
+        </p:nvPicPr>
+        <p:blipFill>
+          <a:blip r:embed="rId2"/>
+          <a:srcRect/>
+          <a:stretch>
+            <a:fillRect/>
+          </a:stretch>
+        </p:blipFill>
+        <p:spPr bwMode="auto">
+          <a:xfrm>
+            <a:off x="654051" y="1276349"/>
+            <a:ext cx="8032749" cy="4819651"/>
+          </a:xfrm>
+          <a:prstGeom prst="rect">
+            <a:avLst/>
+          </a:prstGeom>
+          <a:noFill/>
+        </p:spPr>
+      </p:pic>
     </p:spTree>
   </p:cSld>
   <p:clrMapOvr>
@@ -7263,67 +7561,7 @@
             <a:pPr algn="l" eaLnBrk="1" hangingPunct="1"/>
             <a:r>
               <a:rPr lang="en-US" dirty="0" smtClean="0"/>
-              <a:t>What’s more cyclical?</a:t>
-            </a:r>
-          </a:p>
-        </p:txBody>
-      </p:sp>
-      <p:sp>
-        <p:nvSpPr>
-          <p:cNvPr id="4099" name="Rectangle 3"/>
-          <p:cNvSpPr>
-            <a:spLocks noGrp="1" noChangeArrowheads="1"/>
-          </p:cNvSpPr>
-          <p:nvPr>
-            <p:ph type="body" idx="4294967295"/>
-          </p:nvPr>
-        </p:nvSpPr>
-        <p:spPr/>
-        <p:txBody>
-          <a:bodyPr/>
-          <a:lstStyle/>
-          <a:p>
-            <a:pPr eaLnBrk="1" hangingPunct="1">
-              <a:spcBef>
-                <a:spcPts val="1200"/>
-              </a:spcBef>
-            </a:pPr>
-            <a:r>
-              <a:rPr lang="en-US" sz="2400" dirty="0" smtClean="0"/>
-              <a:t>General Motors</a:t>
-            </a:r>
-          </a:p>
-          <a:p>
-            <a:pPr eaLnBrk="1" hangingPunct="1">
-              <a:spcBef>
-                <a:spcPts val="1200"/>
-              </a:spcBef>
-            </a:pPr>
-            <a:r>
-              <a:rPr lang="en-US" sz="2400" dirty="0" smtClean="0"/>
-              <a:t>Proctor &amp; Gamble </a:t>
-            </a:r>
-          </a:p>
-          <a:p>
-            <a:pPr eaLnBrk="1" hangingPunct="1">
-              <a:spcBef>
-                <a:spcPts val="1200"/>
-              </a:spcBef>
-            </a:pPr>
-            <a:r>
-              <a:rPr lang="en-US" sz="2400" dirty="0" smtClean="0"/>
-              <a:t>Pfizer </a:t>
-            </a:r>
-          </a:p>
-          <a:p>
-            <a:pPr eaLnBrk="1" hangingPunct="1">
-              <a:spcBef>
-                <a:spcPts val="1200"/>
-              </a:spcBef>
-            </a:pPr>
-            <a:r>
-              <a:rPr lang="en-US" sz="2400" dirty="0" smtClean="0"/>
-              <a:t>Johnson &amp; Johnson </a:t>
+              <a:t>Employment</a:t>
             </a:r>
           </a:p>
         </p:txBody>
@@ -7354,6 +7592,32 @@
           </a:p>
         </p:txBody>
       </p:sp>
+      <p:pic>
+        <p:nvPicPr>
+          <p:cNvPr id="144386" name="Picture 2" descr="FRED Graph"/>
+          <p:cNvPicPr>
+            <a:picLocks noChangeAspect="1" noChangeArrowheads="1"/>
+          </p:cNvPicPr>
+          <p:nvPr/>
+        </p:nvPicPr>
+        <p:blipFill>
+          <a:blip r:embed="rId2"/>
+          <a:srcRect/>
+          <a:stretch>
+            <a:fillRect/>
+          </a:stretch>
+        </p:blipFill>
+        <p:spPr bwMode="auto">
+          <a:xfrm>
+            <a:off x="685800" y="1295400"/>
+            <a:ext cx="7905749" cy="4743451"/>
+          </a:xfrm>
+          <a:prstGeom prst="rect">
+            <a:avLst/>
+          </a:prstGeom>
+          <a:noFill/>
+        </p:spPr>
+      </p:pic>
     </p:spTree>
   </p:cSld>
   <p:clrMapOvr>
@@ -7404,94 +7668,7 @@
             <a:pPr algn="l" eaLnBrk="1" hangingPunct="1"/>
             <a:r>
               <a:rPr lang="en-US" dirty="0" smtClean="0"/>
-              <a:t>What’s more cyclical?</a:t>
-            </a:r>
-          </a:p>
-        </p:txBody>
-      </p:sp>
-      <p:sp>
-        <p:nvSpPr>
-          <p:cNvPr id="4099" name="Rectangle 3"/>
-          <p:cNvSpPr>
-            <a:spLocks noGrp="1" noChangeArrowheads="1"/>
-          </p:cNvSpPr>
-          <p:nvPr>
-            <p:ph type="body" idx="4294967295"/>
-          </p:nvPr>
-        </p:nvSpPr>
-        <p:spPr/>
-        <p:txBody>
-          <a:bodyPr/>
-          <a:lstStyle/>
-          <a:p>
-            <a:pPr eaLnBrk="1" hangingPunct="1">
-              <a:spcBef>
-                <a:spcPts val="1200"/>
-              </a:spcBef>
-            </a:pPr>
-            <a:r>
-              <a:rPr lang="en-US" sz="2400" dirty="0" err="1" smtClean="0"/>
-              <a:t>Walmart</a:t>
-            </a:r>
-            <a:endParaRPr lang="en-US" sz="2400" dirty="0" smtClean="0"/>
-          </a:p>
-          <a:p>
-            <a:pPr eaLnBrk="1" hangingPunct="1">
-              <a:spcBef>
-                <a:spcPts val="1200"/>
-              </a:spcBef>
-            </a:pPr>
-            <a:r>
-              <a:rPr lang="en-US" sz="2400" dirty="0" err="1" smtClean="0"/>
-              <a:t>Richemont</a:t>
-            </a:r>
-            <a:r>
-              <a:rPr lang="en-US" sz="2400" dirty="0" smtClean="0"/>
-              <a:t> </a:t>
-            </a:r>
-          </a:p>
-          <a:p>
-            <a:pPr eaLnBrk="1" hangingPunct="1">
-              <a:spcBef>
-                <a:spcPts val="1200"/>
-              </a:spcBef>
-            </a:pPr>
-            <a:r>
-              <a:rPr lang="en-US" sz="2400" dirty="0" smtClean="0"/>
-              <a:t>New York Times </a:t>
-            </a:r>
-          </a:p>
-          <a:p>
-            <a:pPr eaLnBrk="1" hangingPunct="1">
-              <a:spcBef>
-                <a:spcPts val="1200"/>
-              </a:spcBef>
-            </a:pPr>
-            <a:r>
-              <a:rPr lang="en-US" sz="2400" dirty="0" smtClean="0"/>
-              <a:t>Google </a:t>
-            </a:r>
-          </a:p>
-          <a:p>
-            <a:pPr eaLnBrk="1" hangingPunct="1">
-              <a:spcBef>
-                <a:spcPts val="1200"/>
-              </a:spcBef>
-            </a:pPr>
-            <a:r>
-              <a:rPr lang="en-US" sz="2400" dirty="0" smtClean="0"/>
-              <a:t>American Airlines </a:t>
-            </a:r>
-          </a:p>
-          <a:p>
-            <a:pPr eaLnBrk="1" hangingPunct="1">
-              <a:spcBef>
-                <a:spcPts val="1200"/>
-              </a:spcBef>
-            </a:pPr>
-            <a:r>
-              <a:rPr lang="en-US" sz="2400" dirty="0" smtClean="0"/>
-              <a:t>McKinsey </a:t>
+              <a:t>S&amp;P 500</a:t>
             </a:r>
           </a:p>
         </p:txBody>
@@ -7522,6 +7699,32 @@
           </a:p>
         </p:txBody>
       </p:sp>
+      <p:pic>
+        <p:nvPicPr>
+          <p:cNvPr id="143362" name="Picture 2" descr="FRED Graph"/>
+          <p:cNvPicPr>
+            <a:picLocks noChangeAspect="1" noChangeArrowheads="1"/>
+          </p:cNvPicPr>
+          <p:nvPr/>
+        </p:nvPicPr>
+        <p:blipFill>
+          <a:blip r:embed="rId2"/>
+          <a:srcRect/>
+          <a:stretch>
+            <a:fillRect/>
+          </a:stretch>
+        </p:blipFill>
+        <p:spPr bwMode="auto">
+          <a:xfrm>
+            <a:off x="679450" y="1295401"/>
+            <a:ext cx="7873998" cy="4724400"/>
+          </a:xfrm>
+          <a:prstGeom prst="rect">
+            <a:avLst/>
+          </a:prstGeom>
+          <a:noFill/>
+        </p:spPr>
+      </p:pic>
     </p:spTree>
   </p:cSld>
   <p:clrMapOvr>
@@ -7556,12 +7759,12 @@
       </p:grpSpPr>
       <p:sp>
         <p:nvSpPr>
-          <p:cNvPr id="4098" name="Rectangle 2"/>
+          <p:cNvPr id="57346" name="Rectangle 4"/>
           <p:cNvSpPr>
             <a:spLocks noGrp="1" noChangeArrowheads="1"/>
           </p:cNvSpPr>
           <p:nvPr>
-            <p:ph type="title" idx="4294967295"/>
+            <p:ph type="ctrTitle"/>
           </p:nvPr>
         </p:nvSpPr>
         <p:spPr/>
@@ -7569,108 +7772,19 @@
           <a:bodyPr/>
           <a:lstStyle/>
           <a:p>
-            <a:pPr algn="l" eaLnBrk="1" hangingPunct="1"/>
-            <a:r>
-              <a:rPr lang="en-US" dirty="0" smtClean="0"/>
-              <a:t>What have we learned?</a:t>
-            </a:r>
-          </a:p>
-        </p:txBody>
-      </p:sp>
-      <p:sp>
-        <p:nvSpPr>
-          <p:cNvPr id="4099" name="Rectangle 3"/>
-          <p:cNvSpPr>
-            <a:spLocks noGrp="1" noChangeArrowheads="1"/>
-          </p:cNvSpPr>
-          <p:nvPr>
-            <p:ph type="body" idx="4294967295"/>
-          </p:nvPr>
-        </p:nvSpPr>
-        <p:spPr/>
-        <p:txBody>
-          <a:bodyPr/>
-          <a:lstStyle/>
-          <a:p>
-            <a:pPr eaLnBrk="1" hangingPunct="1">
-              <a:spcBef>
-                <a:spcPts val="1200"/>
-              </a:spcBef>
-            </a:pPr>
-            <a:r>
-              <a:rPr lang="en-US" sz="2400" dirty="0" smtClean="0"/>
-              <a:t>Economic growth is volatile</a:t>
-            </a:r>
-          </a:p>
-          <a:p>
-            <a:pPr eaLnBrk="1" hangingPunct="1">
-              <a:spcBef>
-                <a:spcPts val="1200"/>
-              </a:spcBef>
-            </a:pPr>
-            <a:r>
-              <a:rPr lang="en-US" sz="2400" dirty="0" smtClean="0"/>
-              <a:t>Lots of things move up and down together </a:t>
-            </a:r>
-          </a:p>
-          <a:p>
-            <a:pPr lvl="1" eaLnBrk="1" hangingPunct="1">
-              <a:spcBef>
-                <a:spcPts val="1200"/>
-              </a:spcBef>
-            </a:pPr>
-            <a:r>
-              <a:rPr lang="en-US" sz="2000" dirty="0" smtClean="0"/>
-              <a:t>[Like what?]  </a:t>
-            </a:r>
-          </a:p>
-          <a:p>
-            <a:pPr eaLnBrk="1" hangingPunct="1">
-              <a:spcBef>
-                <a:spcPts val="1200"/>
-              </a:spcBef>
-            </a:pPr>
-            <a:r>
-              <a:rPr lang="en-US" sz="2400" dirty="0" smtClean="0"/>
-              <a:t>Some of them move more than others</a:t>
-            </a:r>
-          </a:p>
-          <a:p>
-            <a:pPr lvl="1" eaLnBrk="1" hangingPunct="1">
-              <a:spcBef>
-                <a:spcPts val="1200"/>
-              </a:spcBef>
-            </a:pPr>
-            <a:r>
-              <a:rPr lang="en-US" sz="2000" smtClean="0"/>
-              <a:t>[Which ones?] </a:t>
-            </a:r>
-          </a:p>
-        </p:txBody>
-      </p:sp>
-      <p:sp>
-        <p:nvSpPr>
-          <p:cNvPr id="4100" name="Slide Number Placeholder 3"/>
-          <p:cNvSpPr>
-            <a:spLocks noGrp="1"/>
-          </p:cNvSpPr>
-          <p:nvPr>
-            <p:ph type="sldNum" sz="quarter" idx="12"/>
-          </p:nvPr>
-        </p:nvSpPr>
-        <p:spPr>
-          <a:noFill/>
-        </p:spPr>
-        <p:txBody>
-          <a:bodyPr/>
-          <a:lstStyle/>
-          <a:p>
-            <a:fld id="{E041A9CD-8F68-446A-8192-3D8982304C37}" type="slidenum">
-              <a:rPr lang="en-US" smtClean="0"/>
-              <a:pPr/>
-              <a:t>33</a:t>
-            </a:fld>
-            <a:endParaRPr lang="en-US" smtClean="0"/>
+            <a:pPr eaLnBrk="1" hangingPunct="1"/>
+            <a:r>
+              <a:rPr lang="en-US" i="1" dirty="0" smtClean="0"/>
+              <a:t>What’s </a:t>
+            </a:r>
+            <a:r>
+              <a:rPr lang="en-US" i="1" smtClean="0"/>
+              <a:t>more cyclical</a:t>
+            </a:r>
+            <a:r>
+              <a:rPr lang="en-US" i="1" dirty="0" smtClean="0"/>
+              <a:t>?</a:t>
+            </a:r>
           </a:p>
         </p:txBody>
       </p:sp>
@@ -7724,6 +7838,467 @@
             <a:pPr algn="l" eaLnBrk="1" hangingPunct="1"/>
             <a:r>
               <a:rPr lang="en-US" dirty="0" smtClean="0"/>
+              <a:t>What’s more cyclical?</a:t>
+            </a:r>
+          </a:p>
+        </p:txBody>
+      </p:sp>
+      <p:sp>
+        <p:nvSpPr>
+          <p:cNvPr id="4099" name="Rectangle 3"/>
+          <p:cNvSpPr>
+            <a:spLocks noGrp="1" noChangeArrowheads="1"/>
+          </p:cNvSpPr>
+          <p:nvPr>
+            <p:ph type="body" idx="4294967295"/>
+          </p:nvPr>
+        </p:nvSpPr>
+        <p:spPr/>
+        <p:txBody>
+          <a:bodyPr/>
+          <a:lstStyle/>
+          <a:p>
+            <a:pPr eaLnBrk="1" hangingPunct="1">
+              <a:spcBef>
+                <a:spcPts val="1200"/>
+              </a:spcBef>
+            </a:pPr>
+            <a:r>
+              <a:rPr lang="en-US" sz="2400" dirty="0" smtClean="0"/>
+              <a:t>General Motors</a:t>
+            </a:r>
+          </a:p>
+          <a:p>
+            <a:pPr eaLnBrk="1" hangingPunct="1">
+              <a:spcBef>
+                <a:spcPts val="1200"/>
+              </a:spcBef>
+            </a:pPr>
+            <a:r>
+              <a:rPr lang="en-US" sz="2400" dirty="0" smtClean="0"/>
+              <a:t>Pfizer </a:t>
+            </a:r>
+          </a:p>
+          <a:p>
+            <a:pPr eaLnBrk="1" hangingPunct="1">
+              <a:spcBef>
+                <a:spcPts val="1200"/>
+              </a:spcBef>
+            </a:pPr>
+            <a:r>
+              <a:rPr lang="en-US" sz="2400" dirty="0"/>
+              <a:t>Proctor &amp; Gamble </a:t>
+            </a:r>
+          </a:p>
+          <a:p>
+            <a:pPr eaLnBrk="1" hangingPunct="1">
+              <a:spcBef>
+                <a:spcPts val="1200"/>
+              </a:spcBef>
+            </a:pPr>
+            <a:r>
+              <a:rPr lang="en-US" sz="2400" dirty="0" smtClean="0"/>
+              <a:t>Johnson &amp; Johnson </a:t>
+            </a:r>
+          </a:p>
+        </p:txBody>
+      </p:sp>
+      <p:sp>
+        <p:nvSpPr>
+          <p:cNvPr id="4100" name="Slide Number Placeholder 3"/>
+          <p:cNvSpPr>
+            <a:spLocks noGrp="1"/>
+          </p:cNvSpPr>
+          <p:nvPr>
+            <p:ph type="sldNum" sz="quarter" idx="12"/>
+          </p:nvPr>
+        </p:nvSpPr>
+        <p:spPr>
+          <a:noFill/>
+        </p:spPr>
+        <p:txBody>
+          <a:bodyPr/>
+          <a:lstStyle/>
+          <a:p>
+            <a:fld id="{E041A9CD-8F68-446A-8192-3D8982304C37}" type="slidenum">
+              <a:rPr lang="en-US" smtClean="0"/>
+              <a:pPr/>
+              <a:t>34</a:t>
+            </a:fld>
+            <a:endParaRPr lang="en-US" smtClean="0"/>
+          </a:p>
+        </p:txBody>
+      </p:sp>
+    </p:spTree>
+  </p:cSld>
+  <p:clrMapOvr>
+    <a:masterClrMapping/>
+  </p:clrMapOvr>
+  <p:timing>
+    <p:tnLst>
+      <p:par>
+        <p:cTn id="1" dur="indefinite" restart="never" nodeType="tmRoot"/>
+      </p:par>
+    </p:tnLst>
+  </p:timing>
+</p:sld>
+</file>
+
+<file path=ppt/slides/slide35.xml><?xml version="1.0" encoding="utf-8"?>
+<p:sld xmlns:a="http://schemas.openxmlformats.org/drawingml/2006/main" xmlns:r="http://schemas.openxmlformats.org/officeDocument/2006/relationships" xmlns:p="http://schemas.openxmlformats.org/presentationml/2006/main">
+  <p:cSld>
+    <p:spTree>
+      <p:nvGrpSpPr>
+        <p:cNvPr id="1" name=""/>
+        <p:cNvGrpSpPr/>
+        <p:nvPr/>
+      </p:nvGrpSpPr>
+      <p:grpSpPr>
+        <a:xfrm>
+          <a:off x="0" y="0"/>
+          <a:ext cx="0" cy="0"/>
+          <a:chOff x="0" y="0"/>
+          <a:chExt cx="0" cy="0"/>
+        </a:xfrm>
+      </p:grpSpPr>
+      <p:sp>
+        <p:nvSpPr>
+          <p:cNvPr id="4098" name="Rectangle 2"/>
+          <p:cNvSpPr>
+            <a:spLocks noGrp="1" noChangeArrowheads="1"/>
+          </p:cNvSpPr>
+          <p:nvPr>
+            <p:ph type="title" idx="4294967295"/>
+          </p:nvPr>
+        </p:nvSpPr>
+        <p:spPr/>
+        <p:txBody>
+          <a:bodyPr/>
+          <a:lstStyle/>
+          <a:p>
+            <a:pPr algn="l" eaLnBrk="1" hangingPunct="1"/>
+            <a:r>
+              <a:rPr lang="en-US" dirty="0" smtClean="0"/>
+              <a:t>What’s more cyclical?</a:t>
+            </a:r>
+          </a:p>
+        </p:txBody>
+      </p:sp>
+      <p:sp>
+        <p:nvSpPr>
+          <p:cNvPr id="4099" name="Rectangle 3"/>
+          <p:cNvSpPr>
+            <a:spLocks noGrp="1" noChangeArrowheads="1"/>
+          </p:cNvSpPr>
+          <p:nvPr>
+            <p:ph type="body" idx="4294967295"/>
+          </p:nvPr>
+        </p:nvSpPr>
+        <p:spPr/>
+        <p:txBody>
+          <a:bodyPr/>
+          <a:lstStyle/>
+          <a:p>
+            <a:pPr eaLnBrk="1" hangingPunct="1">
+              <a:spcBef>
+                <a:spcPts val="1200"/>
+              </a:spcBef>
+            </a:pPr>
+            <a:r>
+              <a:rPr lang="en-US" sz="2400" dirty="0" err="1" smtClean="0"/>
+              <a:t>Walmart</a:t>
+            </a:r>
+            <a:endParaRPr lang="en-US" sz="2400" dirty="0" smtClean="0"/>
+          </a:p>
+          <a:p>
+            <a:pPr eaLnBrk="1" hangingPunct="1">
+              <a:spcBef>
+                <a:spcPts val="1200"/>
+              </a:spcBef>
+            </a:pPr>
+            <a:r>
+              <a:rPr lang="en-US" sz="2400" dirty="0" err="1" smtClean="0"/>
+              <a:t>Richemont</a:t>
+            </a:r>
+            <a:r>
+              <a:rPr lang="en-US" sz="2400" dirty="0" smtClean="0"/>
+              <a:t> </a:t>
+            </a:r>
+          </a:p>
+          <a:p>
+            <a:pPr eaLnBrk="1" hangingPunct="1">
+              <a:spcBef>
+                <a:spcPts val="1200"/>
+              </a:spcBef>
+            </a:pPr>
+            <a:r>
+              <a:rPr lang="en-US" sz="2400" dirty="0" smtClean="0"/>
+              <a:t>New York Times </a:t>
+            </a:r>
+          </a:p>
+          <a:p>
+            <a:pPr eaLnBrk="1" hangingPunct="1">
+              <a:spcBef>
+                <a:spcPts val="1200"/>
+              </a:spcBef>
+            </a:pPr>
+            <a:r>
+              <a:rPr lang="en-US" sz="2400" dirty="0" smtClean="0"/>
+              <a:t>Google </a:t>
+            </a:r>
+          </a:p>
+          <a:p>
+            <a:pPr eaLnBrk="1" hangingPunct="1">
+              <a:spcBef>
+                <a:spcPts val="1200"/>
+              </a:spcBef>
+            </a:pPr>
+            <a:r>
+              <a:rPr lang="en-US" sz="2400" dirty="0" smtClean="0"/>
+              <a:t>American Airlines </a:t>
+            </a:r>
+          </a:p>
+          <a:p>
+            <a:pPr eaLnBrk="1" hangingPunct="1">
+              <a:spcBef>
+                <a:spcPts val="1200"/>
+              </a:spcBef>
+            </a:pPr>
+            <a:r>
+              <a:rPr lang="en-US" sz="2400" dirty="0" smtClean="0"/>
+              <a:t>McKinsey </a:t>
+            </a:r>
+          </a:p>
+        </p:txBody>
+      </p:sp>
+      <p:sp>
+        <p:nvSpPr>
+          <p:cNvPr id="4100" name="Slide Number Placeholder 3"/>
+          <p:cNvSpPr>
+            <a:spLocks noGrp="1"/>
+          </p:cNvSpPr>
+          <p:nvPr>
+            <p:ph type="sldNum" sz="quarter" idx="12"/>
+          </p:nvPr>
+        </p:nvSpPr>
+        <p:spPr>
+          <a:noFill/>
+        </p:spPr>
+        <p:txBody>
+          <a:bodyPr/>
+          <a:lstStyle/>
+          <a:p>
+            <a:fld id="{E041A9CD-8F68-446A-8192-3D8982304C37}" type="slidenum">
+              <a:rPr lang="en-US" smtClean="0"/>
+              <a:pPr/>
+              <a:t>35</a:t>
+            </a:fld>
+            <a:endParaRPr lang="en-US" smtClean="0"/>
+          </a:p>
+        </p:txBody>
+      </p:sp>
+    </p:spTree>
+  </p:cSld>
+  <p:clrMapOvr>
+    <a:masterClrMapping/>
+  </p:clrMapOvr>
+  <p:timing>
+    <p:tnLst>
+      <p:par>
+        <p:cTn id="1" dur="indefinite" restart="never" nodeType="tmRoot"/>
+      </p:par>
+    </p:tnLst>
+  </p:timing>
+</p:sld>
+</file>
+
+<file path=ppt/slides/slide36.xml><?xml version="1.0" encoding="utf-8"?>
+<p:sld xmlns:a="http://schemas.openxmlformats.org/drawingml/2006/main" xmlns:r="http://schemas.openxmlformats.org/officeDocument/2006/relationships" xmlns:p="http://schemas.openxmlformats.org/presentationml/2006/main">
+  <p:cSld>
+    <p:spTree>
+      <p:nvGrpSpPr>
+        <p:cNvPr id="1" name=""/>
+        <p:cNvGrpSpPr/>
+        <p:nvPr/>
+      </p:nvGrpSpPr>
+      <p:grpSpPr>
+        <a:xfrm>
+          <a:off x="0" y="0"/>
+          <a:ext cx="0" cy="0"/>
+          <a:chOff x="0" y="0"/>
+          <a:chExt cx="0" cy="0"/>
+        </a:xfrm>
+      </p:grpSpPr>
+      <p:sp>
+        <p:nvSpPr>
+          <p:cNvPr id="4098" name="Rectangle 2"/>
+          <p:cNvSpPr>
+            <a:spLocks noGrp="1" noChangeArrowheads="1"/>
+          </p:cNvSpPr>
+          <p:nvPr>
+            <p:ph type="title" idx="4294967295"/>
+          </p:nvPr>
+        </p:nvSpPr>
+        <p:spPr/>
+        <p:txBody>
+          <a:bodyPr/>
+          <a:lstStyle/>
+          <a:p>
+            <a:pPr algn="l" eaLnBrk="1" hangingPunct="1"/>
+            <a:r>
+              <a:rPr lang="en-US" dirty="0" smtClean="0"/>
+              <a:t>What have we learned?</a:t>
+            </a:r>
+          </a:p>
+        </p:txBody>
+      </p:sp>
+      <p:sp>
+        <p:nvSpPr>
+          <p:cNvPr id="4099" name="Rectangle 3"/>
+          <p:cNvSpPr>
+            <a:spLocks noGrp="1" noChangeArrowheads="1"/>
+          </p:cNvSpPr>
+          <p:nvPr>
+            <p:ph type="body" idx="4294967295"/>
+          </p:nvPr>
+        </p:nvSpPr>
+        <p:spPr/>
+        <p:txBody>
+          <a:bodyPr/>
+          <a:lstStyle/>
+          <a:p>
+            <a:pPr eaLnBrk="1" hangingPunct="1">
+              <a:spcBef>
+                <a:spcPts val="1200"/>
+              </a:spcBef>
+            </a:pPr>
+            <a:r>
+              <a:rPr lang="en-US" sz="2400" dirty="0" smtClean="0"/>
+              <a:t>Economic growth is volatile</a:t>
+            </a:r>
+          </a:p>
+          <a:p>
+            <a:pPr eaLnBrk="1" hangingPunct="1">
+              <a:spcBef>
+                <a:spcPts val="1200"/>
+              </a:spcBef>
+            </a:pPr>
+            <a:r>
+              <a:rPr lang="en-US" sz="2400" dirty="0" smtClean="0"/>
+              <a:t>Lots of things move up and down together </a:t>
+            </a:r>
+          </a:p>
+          <a:p>
+            <a:pPr lvl="1" eaLnBrk="1" hangingPunct="1">
+              <a:spcBef>
+                <a:spcPts val="1200"/>
+              </a:spcBef>
+            </a:pPr>
+            <a:r>
+              <a:rPr lang="en-US" sz="2000" dirty="0" smtClean="0"/>
+              <a:t>[Like what?]  </a:t>
+            </a:r>
+          </a:p>
+          <a:p>
+            <a:pPr eaLnBrk="1" hangingPunct="1">
+              <a:spcBef>
+                <a:spcPts val="1200"/>
+              </a:spcBef>
+            </a:pPr>
+            <a:r>
+              <a:rPr lang="en-US" sz="2400" dirty="0" smtClean="0"/>
+              <a:t>Some of them move more than others</a:t>
+            </a:r>
+          </a:p>
+          <a:p>
+            <a:pPr lvl="1" eaLnBrk="1" hangingPunct="1">
+              <a:spcBef>
+                <a:spcPts val="1200"/>
+              </a:spcBef>
+            </a:pPr>
+            <a:r>
+              <a:rPr lang="en-US" sz="2000" smtClean="0"/>
+              <a:t>[Which ones?] </a:t>
+            </a:r>
+          </a:p>
+        </p:txBody>
+      </p:sp>
+      <p:sp>
+        <p:nvSpPr>
+          <p:cNvPr id="4100" name="Slide Number Placeholder 3"/>
+          <p:cNvSpPr>
+            <a:spLocks noGrp="1"/>
+          </p:cNvSpPr>
+          <p:nvPr>
+            <p:ph type="sldNum" sz="quarter" idx="12"/>
+          </p:nvPr>
+        </p:nvSpPr>
+        <p:spPr>
+          <a:noFill/>
+        </p:spPr>
+        <p:txBody>
+          <a:bodyPr/>
+          <a:lstStyle/>
+          <a:p>
+            <a:fld id="{E041A9CD-8F68-446A-8192-3D8982304C37}" type="slidenum">
+              <a:rPr lang="en-US" smtClean="0"/>
+              <a:pPr/>
+              <a:t>36</a:t>
+            </a:fld>
+            <a:endParaRPr lang="en-US" smtClean="0"/>
+          </a:p>
+        </p:txBody>
+      </p:sp>
+    </p:spTree>
+  </p:cSld>
+  <p:clrMapOvr>
+    <a:masterClrMapping/>
+  </p:clrMapOvr>
+  <p:timing>
+    <p:tnLst>
+      <p:par>
+        <p:cTn id="1" dur="indefinite" restart="never" nodeType="tmRoot"/>
+      </p:par>
+    </p:tnLst>
+  </p:timing>
+</p:sld>
+</file>
+
+<file path=ppt/slides/slide37.xml><?xml version="1.0" encoding="utf-8"?>
+<p:sld xmlns:a="http://schemas.openxmlformats.org/drawingml/2006/main" xmlns:r="http://schemas.openxmlformats.org/officeDocument/2006/relationships" xmlns:p="http://schemas.openxmlformats.org/presentationml/2006/main">
+  <p:cSld>
+    <p:spTree>
+      <p:nvGrpSpPr>
+        <p:cNvPr id="1" name=""/>
+        <p:cNvGrpSpPr/>
+        <p:nvPr/>
+      </p:nvGrpSpPr>
+      <p:grpSpPr>
+        <a:xfrm>
+          <a:off x="0" y="0"/>
+          <a:ext cx="0" cy="0"/>
+          <a:chOff x="0" y="0"/>
+          <a:chExt cx="0" cy="0"/>
+        </a:xfrm>
+      </p:grpSpPr>
+      <p:sp>
+        <p:nvSpPr>
+          <p:cNvPr id="4098" name="Rectangle 2"/>
+          <p:cNvSpPr>
+            <a:spLocks noGrp="1" noChangeArrowheads="1"/>
+          </p:cNvSpPr>
+          <p:nvPr>
+            <p:ph type="title" idx="4294967295"/>
+          </p:nvPr>
+        </p:nvSpPr>
+        <p:spPr/>
+        <p:txBody>
+          <a:bodyPr/>
+          <a:lstStyle/>
+          <a:p>
+            <a:pPr algn="l" eaLnBrk="1" hangingPunct="1"/>
+            <a:r>
+              <a:rPr lang="en-US" dirty="0" smtClean="0"/>
               <a:t>For the ride home</a:t>
             </a:r>
           </a:p>
@@ -7792,19 +8367,13 @@
             </a:pPr>
             <a:r>
               <a:rPr lang="en-US" sz="2000" dirty="0" smtClean="0"/>
-              <a:t>What indicators do you think would be helpful?  </a:t>
-            </a:r>
-          </a:p>
-          <a:p>
-            <a:pPr eaLnBrk="1" hangingPunct="1">
-              <a:spcBef>
-                <a:spcPts val="1200"/>
-              </a:spcBef>
-            </a:pPr>
-            <a:r>
-              <a:rPr lang="en-US" sz="2400" dirty="0" smtClean="0"/>
-              <a:t>As an example, skim the JP Morgan report linked on the discussion page – or other similar source    </a:t>
-            </a:r>
+              <a:t>What indicators do you think would be helpful</a:t>
+            </a:r>
+            <a:r>
+              <a:rPr lang="en-US" sz="2000" smtClean="0"/>
+              <a:t>?  </a:t>
+            </a:r>
+            <a:endParaRPr lang="en-US" sz="2000" dirty="0" smtClean="0"/>
           </a:p>
         </p:txBody>
       </p:sp>
@@ -7828,7 +8397,7 @@
             <a:fld id="{E041A9CD-8F68-446A-8192-3D8982304C37}" type="slidenum">
               <a:rPr lang="en-US" smtClean="0"/>
               <a:pPr/>
-              <a:t>34</a:t>
+              <a:t>37</a:t>
             </a:fld>
             <a:endParaRPr lang="en-US" smtClean="0"/>
           </a:p>
@@ -8087,103 +8656,77 @@
             </a:pPr>
             <a:r>
               <a:rPr lang="en-US" sz="2400" dirty="0" smtClean="0"/>
-              <a:t>From the Bloomberg Economic Calendar </a:t>
-            </a:r>
-          </a:p>
-          <a:p>
-            <a:pPr lvl="1" eaLnBrk="1" hangingPunct="1">
+              <a:t>Leo </a:t>
+            </a:r>
+            <a:r>
+              <a:rPr lang="en-US" sz="2400" dirty="0" err="1" smtClean="0"/>
+              <a:t>Mirani</a:t>
+            </a:r>
+            <a:r>
+              <a:rPr lang="en-US" sz="2400" dirty="0" smtClean="0"/>
+              <a:t>, Quartz, October 2014</a:t>
+            </a:r>
+          </a:p>
+          <a:p>
+            <a:pPr lvl="1">
+              <a:spcBef>
+                <a:spcPts val="1200"/>
+              </a:spcBef>
+            </a:pPr>
+            <a:r>
+              <a:rPr lang="en-US" sz="2000" dirty="0"/>
+              <a:t>Facebook’s corporation tax in the United Kingdom for 2013 came to a grand total of £3,169 ($4,005</a:t>
+            </a:r>
+            <a:r>
+              <a:rPr lang="en-US" sz="2000" dirty="0" smtClean="0"/>
+              <a:t>). </a:t>
+            </a:r>
+            <a:r>
+              <a:rPr lang="en-US" sz="2000" dirty="0"/>
+              <a:t> The company also received £185,196 in credits from previous years, leaving it with a credit balance of £</a:t>
+            </a:r>
+            <a:r>
+              <a:rPr lang="en-US" sz="2000" dirty="0" smtClean="0"/>
+              <a:t>182,027.  The </a:t>
+            </a:r>
+            <a:r>
+              <a:rPr lang="en-US" sz="2000" dirty="0"/>
+              <a:t>income tax paid by an inner London school teacher </a:t>
+            </a:r>
+            <a:r>
+              <a:rPr lang="en-US" sz="2000" dirty="0" smtClean="0"/>
+              <a:t>comes </a:t>
+            </a:r>
+            <a:r>
+              <a:rPr lang="en-US" sz="2000" dirty="0"/>
+              <a:t>to </a:t>
+            </a:r>
+            <a:r>
+              <a:rPr lang="en-US" sz="2000" dirty="0" smtClean="0"/>
+              <a:t>just over </a:t>
+            </a:r>
+            <a:r>
+              <a:rPr lang="en-US" sz="2000" dirty="0"/>
+              <a:t>£3,500</a:t>
+            </a:r>
+            <a:r>
+              <a:rPr lang="en-US" sz="2000" dirty="0" smtClean="0"/>
+              <a:t>.  </a:t>
+            </a:r>
+            <a:endParaRPr lang="en-US" sz="2000" dirty="0"/>
+          </a:p>
+          <a:p>
+            <a:pPr eaLnBrk="1" hangingPunct="1">
               <a:spcBef>
                 <a:spcPts val="1200"/>
               </a:spcBef>
               <a:spcAft>
-                <a:spcPts val="0"/>
+                <a:spcPts val="600"/>
               </a:spcAft>
             </a:pPr>
             <a:r>
-              <a:rPr lang="en-US" sz="2000" dirty="0" smtClean="0"/>
-              <a:t>Monday:  Industrial production </a:t>
-            </a:r>
-          </a:p>
-          <a:p>
-            <a:pPr lvl="1" eaLnBrk="1" hangingPunct="1">
-              <a:spcBef>
-                <a:spcPts val="1200"/>
-              </a:spcBef>
-              <a:spcAft>
-                <a:spcPts val="0"/>
-              </a:spcAft>
-            </a:pPr>
-            <a:r>
-              <a:rPr lang="en-US" sz="2000" dirty="0" smtClean="0"/>
-              <a:t>Tuesday:  Retail sales, consumer confidence  </a:t>
-            </a:r>
-          </a:p>
-          <a:p>
-            <a:pPr lvl="1" eaLnBrk="1" hangingPunct="1">
-              <a:spcBef>
-                <a:spcPts val="1200"/>
-              </a:spcBef>
-              <a:spcAft>
-                <a:spcPts val="0"/>
-              </a:spcAft>
-            </a:pPr>
-            <a:r>
-              <a:rPr lang="en-US" sz="2000" dirty="0" smtClean="0"/>
-              <a:t>Wednesday:  FOMC announcement, ADP employment</a:t>
-            </a:r>
-          </a:p>
-          <a:p>
-            <a:pPr lvl="1" eaLnBrk="1" hangingPunct="1">
-              <a:spcBef>
-                <a:spcPts val="1200"/>
-              </a:spcBef>
-              <a:spcAft>
-                <a:spcPts val="0"/>
-              </a:spcAft>
-            </a:pPr>
-            <a:r>
-              <a:rPr lang="en-US" sz="2000" dirty="0" smtClean="0"/>
-              <a:t>Thursday:  Jobless claims </a:t>
-            </a:r>
-          </a:p>
-          <a:p>
-            <a:pPr lvl="1" eaLnBrk="1" hangingPunct="1">
-              <a:spcBef>
-                <a:spcPts val="1200"/>
-              </a:spcBef>
-              <a:spcAft>
-                <a:spcPts val="0"/>
-              </a:spcAft>
-            </a:pPr>
-            <a:r>
-              <a:rPr lang="en-US" sz="2000" dirty="0" smtClean="0"/>
-              <a:t>Next week:  GDP, employment </a:t>
-            </a:r>
-          </a:p>
-          <a:p>
-            <a:pPr lvl="1" eaLnBrk="1" hangingPunct="1">
-              <a:spcBef>
-                <a:spcPts val="1200"/>
-              </a:spcBef>
-              <a:spcAft>
-                <a:spcPts val="0"/>
-              </a:spcAft>
-            </a:pPr>
-            <a:r>
-              <a:rPr lang="en-US" sz="2000" dirty="0" smtClean="0"/>
-              <a:t>More on this next class </a:t>
-            </a:r>
-            <a:endParaRPr lang="en-US" sz="2400" dirty="0" smtClean="0"/>
-          </a:p>
-          <a:p>
-            <a:pPr eaLnBrk="1" hangingPunct="1">
-              <a:spcBef>
-                <a:spcPts val="1200"/>
-              </a:spcBef>
-            </a:pPr>
-            <a:r>
               <a:rPr lang="en-US" sz="2400" dirty="0" smtClean="0"/>
-              <a:t>Bloomberg -&gt; Market Data -&gt; Economic Calendar </a:t>
+              <a:t>What’s going on here?  What do you think?  </a:t>
             </a:r>
           </a:p>
         </p:txBody>
@@ -8214,37 +8757,12 @@
           </a:p>
         </p:txBody>
       </p:sp>
-      <p:sp>
-        <p:nvSpPr>
-          <p:cNvPr id="6" name="TextBox 5"/>
-          <p:cNvSpPr txBox="1"/>
-          <p:nvPr/>
-        </p:nvSpPr>
-        <p:spPr>
-          <a:xfrm>
-            <a:off x="533400" y="6248400"/>
-            <a:ext cx="4419600" cy="276999"/>
-          </a:xfrm>
-          <a:prstGeom prst="rect">
-            <a:avLst/>
-          </a:prstGeom>
-          <a:noFill/>
-        </p:spPr>
-        <p:txBody>
-          <a:bodyPr wrap="square" rtlCol="0">
-            <a:spAutoFit/>
-          </a:bodyPr>
-          <a:lstStyle/>
-          <a:p>
-            <a:r>
-              <a:rPr lang="en-US" sz="1200" dirty="0" smtClean="0"/>
-              <a:t>Source:  Bloomberg, Economic Calendar.  </a:t>
-            </a:r>
-            <a:endParaRPr lang="en-US" sz="1200" dirty="0"/>
-          </a:p>
-        </p:txBody>
-      </p:sp>
     </p:spTree>
+    <p:extLst>
+      <p:ext uri="{BB962C8B-B14F-4D97-AF65-F5344CB8AC3E}">
+        <p14:creationId xmlns:p14="http://schemas.microsoft.com/office/powerpoint/2010/main" val="378269103"/>
+      </p:ext>
+    </p:extLst>
   </p:cSld>
   <p:clrMapOvr>
     <a:masterClrMapping/>
@@ -8278,12 +8796,12 @@
       </p:grpSpPr>
       <p:sp>
         <p:nvSpPr>
-          <p:cNvPr id="57346" name="Rectangle 4"/>
+          <p:cNvPr id="4098" name="Rectangle 2"/>
           <p:cNvSpPr>
             <a:spLocks noGrp="1" noChangeArrowheads="1"/>
           </p:cNvSpPr>
           <p:nvPr>
-            <p:ph type="ctrTitle"/>
+            <p:ph type="title" idx="4294967295"/>
           </p:nvPr>
         </p:nvSpPr>
         <p:spPr/>
@@ -8291,11 +8809,221 @@
           <a:bodyPr/>
           <a:lstStyle/>
           <a:p>
-            <a:pPr eaLnBrk="1" hangingPunct="1"/>
-            <a:r>
-              <a:rPr lang="en-US" i="1" dirty="0" smtClean="0"/>
-              <a:t>Business cycles</a:t>
-            </a:r>
+            <a:pPr algn="l" eaLnBrk="1" hangingPunct="1"/>
+            <a:r>
+              <a:rPr lang="en-US" dirty="0" smtClean="0"/>
+              <a:t>What’s happening?</a:t>
+            </a:r>
+          </a:p>
+        </p:txBody>
+      </p:sp>
+      <p:sp>
+        <p:nvSpPr>
+          <p:cNvPr id="4099" name="Rectangle 3"/>
+          <p:cNvSpPr>
+            <a:spLocks noGrp="1" noChangeArrowheads="1"/>
+          </p:cNvSpPr>
+          <p:nvPr>
+            <p:ph type="body" idx="4294967295"/>
+          </p:nvPr>
+        </p:nvSpPr>
+        <p:spPr>
+          <a:xfrm>
+            <a:off x="457200" y="1493837"/>
+            <a:ext cx="7848600" cy="4525963"/>
+          </a:xfrm>
+        </p:spPr>
+        <p:txBody>
+          <a:bodyPr/>
+          <a:lstStyle/>
+          <a:p>
+            <a:pPr eaLnBrk="1" hangingPunct="1">
+              <a:spcBef>
+                <a:spcPts val="1200"/>
+              </a:spcBef>
+              <a:spcAft>
+                <a:spcPts val="600"/>
+              </a:spcAft>
+            </a:pPr>
+            <a:r>
+              <a:rPr lang="en-US" sz="2400" dirty="0" smtClean="0"/>
+              <a:t>From the Bloomberg Economic Calendar </a:t>
+            </a:r>
+          </a:p>
+          <a:p>
+            <a:pPr lvl="1" eaLnBrk="1" hangingPunct="1">
+              <a:spcBef>
+                <a:spcPts val="1200"/>
+              </a:spcBef>
+              <a:spcAft>
+                <a:spcPts val="0"/>
+              </a:spcAft>
+            </a:pPr>
+            <a:r>
+              <a:rPr lang="en-US" sz="2000" dirty="0" smtClean="0"/>
+              <a:t>Wednesday:  FOMC announcement, ADP employment</a:t>
+            </a:r>
+          </a:p>
+          <a:p>
+            <a:pPr lvl="1" eaLnBrk="1" hangingPunct="1">
+              <a:spcBef>
+                <a:spcPts val="1200"/>
+              </a:spcBef>
+              <a:spcAft>
+                <a:spcPts val="0"/>
+              </a:spcAft>
+            </a:pPr>
+            <a:r>
+              <a:rPr lang="en-US" sz="2000" dirty="0" smtClean="0"/>
+              <a:t>Thursday:  </a:t>
+            </a:r>
+            <a:r>
+              <a:rPr lang="en-US" sz="2000" dirty="0" smtClean="0"/>
+              <a:t>GDP</a:t>
+            </a:r>
+            <a:r>
+              <a:rPr lang="en-US" sz="2000" smtClean="0"/>
+              <a:t>, jobless </a:t>
+            </a:r>
+            <a:r>
+              <a:rPr lang="en-US" sz="2000" dirty="0" smtClean="0"/>
+              <a:t>claims </a:t>
+            </a:r>
+            <a:endParaRPr lang="en-US" sz="2000" dirty="0" smtClean="0"/>
+          </a:p>
+          <a:p>
+            <a:pPr lvl="1" eaLnBrk="1" hangingPunct="1">
+              <a:spcBef>
+                <a:spcPts val="1200"/>
+              </a:spcBef>
+              <a:spcAft>
+                <a:spcPts val="0"/>
+              </a:spcAft>
+            </a:pPr>
+            <a:r>
+              <a:rPr lang="en-US" sz="2000" dirty="0" smtClean="0"/>
+              <a:t>Friday:  Consumer Sentiment, PMI </a:t>
+            </a:r>
+          </a:p>
+          <a:p>
+            <a:pPr lvl="1" eaLnBrk="1" hangingPunct="1">
+              <a:spcBef>
+                <a:spcPts val="1200"/>
+              </a:spcBef>
+              <a:spcAft>
+                <a:spcPts val="0"/>
+              </a:spcAft>
+            </a:pPr>
+            <a:r>
+              <a:rPr lang="en-US" sz="2000" dirty="0" smtClean="0"/>
+              <a:t>Next Wednesday:  ADP employment report</a:t>
+            </a:r>
+            <a:endParaRPr lang="en-US" sz="2000" dirty="0"/>
+          </a:p>
+          <a:p>
+            <a:pPr lvl="1" eaLnBrk="1" hangingPunct="1">
+              <a:spcBef>
+                <a:spcPts val="1200"/>
+              </a:spcBef>
+              <a:spcAft>
+                <a:spcPts val="0"/>
+              </a:spcAft>
+            </a:pPr>
+            <a:r>
+              <a:rPr lang="en-US" sz="2000" dirty="0" smtClean="0"/>
+              <a:t>Next Friday</a:t>
+            </a:r>
+            <a:r>
+              <a:rPr lang="en-US" sz="2000" dirty="0"/>
+              <a:t>:  </a:t>
+            </a:r>
+            <a:r>
+              <a:rPr lang="en-US" sz="2000" dirty="0" smtClean="0"/>
+              <a:t>BLS employment report  </a:t>
+            </a:r>
+            <a:endParaRPr lang="en-US" sz="2000" dirty="0"/>
+          </a:p>
+          <a:p>
+            <a:pPr lvl="1" eaLnBrk="1" hangingPunct="1">
+              <a:spcBef>
+                <a:spcPts val="1200"/>
+              </a:spcBef>
+              <a:spcAft>
+                <a:spcPts val="0"/>
+              </a:spcAft>
+            </a:pPr>
+            <a:r>
+              <a:rPr lang="en-US" sz="2000" dirty="0" smtClean="0"/>
+              <a:t>More next class </a:t>
+            </a:r>
+            <a:endParaRPr lang="en-US" sz="2400" dirty="0" smtClean="0"/>
+          </a:p>
+          <a:p>
+            <a:pPr eaLnBrk="1" hangingPunct="1">
+              <a:spcBef>
+                <a:spcPts val="1200"/>
+              </a:spcBef>
+            </a:pPr>
+            <a:r>
+              <a:rPr lang="en-US" sz="2400" dirty="0" smtClean="0"/>
+              <a:t>Bloomberg -&gt; Markets -&gt; Economic Calendar </a:t>
+            </a:r>
+          </a:p>
+        </p:txBody>
+      </p:sp>
+      <p:sp>
+        <p:nvSpPr>
+          <p:cNvPr id="4100" name="Slide Number Placeholder 3"/>
+          <p:cNvSpPr>
+            <a:spLocks noGrp="1"/>
+          </p:cNvSpPr>
+          <p:nvPr>
+            <p:ph type="sldNum" sz="quarter" idx="12"/>
+          </p:nvPr>
+        </p:nvSpPr>
+        <p:spPr>
+          <a:noFill/>
+        </p:spPr>
+        <p:txBody>
+          <a:bodyPr/>
+          <a:lstStyle/>
+          <a:p>
+            <a:fld id="{E041A9CD-8F68-446A-8192-3D8982304C37}" type="slidenum">
+              <a:rPr lang="en-US" smtClean="0"/>
+              <a:pPr/>
+              <a:t>6</a:t>
+            </a:fld>
+            <a:endParaRPr lang="en-US" dirty="0" smtClean="0"/>
+          </a:p>
+        </p:txBody>
+      </p:sp>
+      <p:sp>
+        <p:nvSpPr>
+          <p:cNvPr id="6" name="TextBox 5"/>
+          <p:cNvSpPr txBox="1"/>
+          <p:nvPr/>
+        </p:nvSpPr>
+        <p:spPr>
+          <a:xfrm>
+            <a:off x="533400" y="6248400"/>
+            <a:ext cx="4419600" cy="276999"/>
+          </a:xfrm>
+          <a:prstGeom prst="rect">
+            <a:avLst/>
+          </a:prstGeom>
+          <a:noFill/>
+        </p:spPr>
+        <p:txBody>
+          <a:bodyPr wrap="square" rtlCol="0">
+            <a:spAutoFit/>
+          </a:bodyPr>
+          <a:lstStyle/>
+          <a:p>
+            <a:r>
+              <a:rPr lang="en-US" sz="1200" dirty="0" smtClean="0"/>
+              <a:t>Source:  Bloomberg, Economic Calendar.  </a:t>
+            </a:r>
+            <a:endParaRPr lang="en-US" sz="1200" dirty="0"/>
           </a:p>
         </p:txBody>
       </p:sp>
@@ -8333,12 +9061,12 @@
       </p:grpSpPr>
       <p:sp>
         <p:nvSpPr>
-          <p:cNvPr id="4098" name="Rectangle 2"/>
+          <p:cNvPr id="57346" name="Rectangle 4"/>
           <p:cNvSpPr>
             <a:spLocks noGrp="1" noChangeArrowheads="1"/>
           </p:cNvSpPr>
           <p:nvPr>
-            <p:ph type="title" idx="4294967295"/>
+            <p:ph type="ctrTitle"/>
           </p:nvPr>
         </p:nvSpPr>
         <p:spPr/>
@@ -8346,109 +9074,11 @@
           <a:bodyPr/>
           <a:lstStyle/>
           <a:p>
-            <a:pPr algn="l" eaLnBrk="1" hangingPunct="1"/>
-            <a:r>
-              <a:rPr lang="en-US" dirty="0" smtClean="0"/>
-              <a:t>Business cycles:  what are they? </a:t>
-            </a:r>
-          </a:p>
-        </p:txBody>
-      </p:sp>
-      <p:sp>
-        <p:nvSpPr>
-          <p:cNvPr id="4099" name="Rectangle 3"/>
-          <p:cNvSpPr>
-            <a:spLocks noGrp="1" noChangeArrowheads="1"/>
-          </p:cNvSpPr>
-          <p:nvPr>
-            <p:ph type="body" idx="4294967295"/>
-          </p:nvPr>
-        </p:nvSpPr>
-        <p:spPr>
-          <a:xfrm>
-            <a:off x="457200" y="1600200"/>
-            <a:ext cx="7772400" cy="4525963"/>
-          </a:xfrm>
-        </p:spPr>
-        <p:txBody>
-          <a:bodyPr/>
-          <a:lstStyle/>
-          <a:p>
-            <a:pPr eaLnBrk="1" hangingPunct="1">
-              <a:spcBef>
-                <a:spcPts val="1200"/>
-              </a:spcBef>
-            </a:pPr>
-            <a:r>
-              <a:rPr lang="en-US" sz="2400" dirty="0" smtClean="0"/>
-              <a:t>Burns and Mitchell</a:t>
-            </a:r>
-          </a:p>
-          <a:p>
-            <a:pPr lvl="1" eaLnBrk="1" hangingPunct="1">
-              <a:lnSpc>
-                <a:spcPct val="90000"/>
-              </a:lnSpc>
-              <a:spcBef>
-                <a:spcPts val="1200"/>
-              </a:spcBef>
-            </a:pPr>
-            <a:r>
-              <a:rPr lang="en-US" sz="2000" dirty="0" smtClean="0"/>
-              <a:t>“Business cycles” are fluctuations in aggregate economic activity.  Expansions occur in many economic activities, followed by similarly general recessions, which merge into the next “cycle.”  </a:t>
-            </a:r>
-          </a:p>
-          <a:p>
-            <a:pPr eaLnBrk="1" hangingPunct="1">
-              <a:lnSpc>
-                <a:spcPct val="90000"/>
-              </a:lnSpc>
-              <a:spcBef>
-                <a:spcPts val="1200"/>
-              </a:spcBef>
-            </a:pPr>
-            <a:r>
-              <a:rPr lang="en-US" sz="2400" dirty="0" smtClean="0"/>
-              <a:t>That is:  short-term fluctuations in growth rates </a:t>
-            </a:r>
-          </a:p>
-          <a:p>
-            <a:pPr eaLnBrk="1" hangingPunct="1">
-              <a:lnSpc>
-                <a:spcPct val="90000"/>
-              </a:lnSpc>
-              <a:spcBef>
-                <a:spcPts val="1200"/>
-              </a:spcBef>
-              <a:buNone/>
-            </a:pPr>
-            <a:endParaRPr lang="en-US" sz="2400" dirty="0" smtClean="0"/>
-          </a:p>
-        </p:txBody>
-      </p:sp>
-      <p:sp>
-        <p:nvSpPr>
-          <p:cNvPr id="4100" name="Slide Number Placeholder 3"/>
-          <p:cNvSpPr>
-            <a:spLocks noGrp="1"/>
-          </p:cNvSpPr>
-          <p:nvPr>
-            <p:ph type="sldNum" sz="quarter" idx="12"/>
-          </p:nvPr>
-        </p:nvSpPr>
-        <p:spPr>
-          <a:noFill/>
-        </p:spPr>
-        <p:txBody>
-          <a:bodyPr/>
-          <a:lstStyle/>
-          <a:p>
-            <a:fld id="{E041A9CD-8F68-446A-8192-3D8982304C37}" type="slidenum">
-              <a:rPr lang="en-US" smtClean="0"/>
-              <a:pPr/>
-              <a:t>7</a:t>
-            </a:fld>
-            <a:endParaRPr lang="en-US" smtClean="0"/>
+            <a:pPr eaLnBrk="1" hangingPunct="1"/>
+            <a:r>
+              <a:rPr lang="en-US" i="1" dirty="0" smtClean="0"/>
+              <a:t>Business cycles</a:t>
+            </a:r>
           </a:p>
         </p:txBody>
       </p:sp>
@@ -8468,6 +9098,159 @@
 </file>
 
 <file path=ppt/slides/slide8.xml><?xml version="1.0" encoding="utf-8"?>
+<p:sld xmlns:a="http://schemas.openxmlformats.org/drawingml/2006/main" xmlns:r="http://schemas.openxmlformats.org/officeDocument/2006/relationships" xmlns:p="http://schemas.openxmlformats.org/presentationml/2006/main">
+  <p:cSld>
+    <p:spTree>
+      <p:nvGrpSpPr>
+        <p:cNvPr id="1" name=""/>
+        <p:cNvGrpSpPr/>
+        <p:nvPr/>
+      </p:nvGrpSpPr>
+      <p:grpSpPr>
+        <a:xfrm>
+          <a:off x="0" y="0"/>
+          <a:ext cx="0" cy="0"/>
+          <a:chOff x="0" y="0"/>
+          <a:chExt cx="0" cy="0"/>
+        </a:xfrm>
+      </p:grpSpPr>
+      <p:sp>
+        <p:nvSpPr>
+          <p:cNvPr id="4098" name="Rectangle 2"/>
+          <p:cNvSpPr>
+            <a:spLocks noGrp="1" noChangeArrowheads="1"/>
+          </p:cNvSpPr>
+          <p:nvPr>
+            <p:ph type="title" idx="4294967295"/>
+          </p:nvPr>
+        </p:nvSpPr>
+        <p:spPr/>
+        <p:txBody>
+          <a:bodyPr/>
+          <a:lstStyle/>
+          <a:p>
+            <a:pPr algn="l" eaLnBrk="1" hangingPunct="1"/>
+            <a:r>
+              <a:rPr lang="en-US" dirty="0" smtClean="0"/>
+              <a:t>Business cycles:  what are they? </a:t>
+            </a:r>
+          </a:p>
+        </p:txBody>
+      </p:sp>
+      <p:sp>
+        <p:nvSpPr>
+          <p:cNvPr id="4099" name="Rectangle 3"/>
+          <p:cNvSpPr>
+            <a:spLocks noGrp="1" noChangeArrowheads="1"/>
+          </p:cNvSpPr>
+          <p:nvPr>
+            <p:ph type="body" idx="4294967295"/>
+          </p:nvPr>
+        </p:nvSpPr>
+        <p:spPr>
+          <a:xfrm>
+            <a:off x="457200" y="1600200"/>
+            <a:ext cx="7772400" cy="4525963"/>
+          </a:xfrm>
+        </p:spPr>
+        <p:txBody>
+          <a:bodyPr/>
+          <a:lstStyle/>
+          <a:p>
+            <a:pPr eaLnBrk="1" hangingPunct="1">
+              <a:spcBef>
+                <a:spcPts val="1200"/>
+              </a:spcBef>
+            </a:pPr>
+            <a:r>
+              <a:rPr lang="en-US" sz="2400" dirty="0" smtClean="0"/>
+              <a:t>Burns and Mitchell</a:t>
+            </a:r>
+          </a:p>
+          <a:p>
+            <a:pPr lvl="1" eaLnBrk="1" hangingPunct="1">
+              <a:lnSpc>
+                <a:spcPct val="90000"/>
+              </a:lnSpc>
+              <a:spcBef>
+                <a:spcPts val="1200"/>
+              </a:spcBef>
+            </a:pPr>
+            <a:r>
+              <a:rPr lang="en-US" sz="2000" dirty="0" smtClean="0"/>
+              <a:t>“Business cycles” are fluctuations in aggregate economic activity.  Expansions occur in many economic activities, followed by similarly general recessions, which merge into the next “cycle.”  </a:t>
+            </a:r>
+          </a:p>
+          <a:p>
+            <a:pPr eaLnBrk="1" hangingPunct="1">
+              <a:lnSpc>
+                <a:spcPct val="90000"/>
+              </a:lnSpc>
+              <a:spcBef>
+                <a:spcPts val="1200"/>
+              </a:spcBef>
+            </a:pPr>
+            <a:r>
+              <a:rPr lang="en-US" sz="2400" dirty="0" smtClean="0"/>
+              <a:t>That is:  short-term fluctuations in growth rates </a:t>
+            </a:r>
+          </a:p>
+          <a:p>
+            <a:pPr eaLnBrk="1" hangingPunct="1">
+              <a:lnSpc>
+                <a:spcPct val="90000"/>
+              </a:lnSpc>
+              <a:spcBef>
+                <a:spcPts val="1200"/>
+              </a:spcBef>
+              <a:buNone/>
+            </a:pPr>
+            <a:endParaRPr lang="en-US" sz="2400" dirty="0" smtClean="0"/>
+          </a:p>
+        </p:txBody>
+      </p:sp>
+      <p:sp>
+        <p:nvSpPr>
+          <p:cNvPr id="4100" name="Slide Number Placeholder 3"/>
+          <p:cNvSpPr>
+            <a:spLocks noGrp="1"/>
+          </p:cNvSpPr>
+          <p:nvPr>
+            <p:ph type="sldNum" sz="quarter" idx="12"/>
+          </p:nvPr>
+        </p:nvSpPr>
+        <p:spPr>
+          <a:noFill/>
+        </p:spPr>
+        <p:txBody>
+          <a:bodyPr/>
+          <a:lstStyle/>
+          <a:p>
+            <a:fld id="{E041A9CD-8F68-446A-8192-3D8982304C37}" type="slidenum">
+              <a:rPr lang="en-US" smtClean="0"/>
+              <a:pPr/>
+              <a:t>8</a:t>
+            </a:fld>
+            <a:endParaRPr lang="en-US" smtClean="0"/>
+          </a:p>
+        </p:txBody>
+      </p:sp>
+    </p:spTree>
+  </p:cSld>
+  <p:clrMapOvr>
+    <a:masterClrMapping/>
+  </p:clrMapOvr>
+  <p:timing>
+    <p:tnLst>
+      <p:par>
+        <p:cTn id="1" dur="indefinite" restart="never" nodeType="tmRoot"/>
+      </p:par>
+    </p:tnLst>
+  </p:timing>
+</p:sld>
+</file>
+
+<file path=ppt/slides/slide9.xml><?xml version="1.0" encoding="utf-8"?>
 <p:sld xmlns:a="http://schemas.openxmlformats.org/drawingml/2006/main" xmlns:r="http://schemas.openxmlformats.org/officeDocument/2006/relationships" xmlns:p="http://schemas.openxmlformats.org/presentationml/2006/main">
   <p:cSld>
     <p:spTree>
@@ -9001,7 +9784,7 @@
               <a:pPr>
                 <a:defRPr/>
               </a:pPr>
-              <a:t>8</a:t>
+              <a:t>9</a:t>
             </a:fld>
             <a:endParaRPr lang="en-US"/>
           </a:p>
@@ -9098,225 +9881,6 @@
             <a:endParaRPr lang="en-US" sz="2200" dirty="0">
               <a:latin typeface="Palatino Linotype" pitchFamily="18" charset="0"/>
             </a:endParaRPr>
-          </a:p>
-        </p:txBody>
-      </p:sp>
-    </p:spTree>
-  </p:cSld>
-  <p:clrMapOvr>
-    <a:masterClrMapping/>
-  </p:clrMapOvr>
-  <p:timing>
-    <p:tnLst>
-      <p:par>
-        <p:cTn id="1" dur="indefinite" restart="never" nodeType="tmRoot"/>
-      </p:par>
-    </p:tnLst>
-  </p:timing>
-</p:sld>
-</file>
-
-<file path=ppt/slides/slide9.xml><?xml version="1.0" encoding="utf-8"?>
-<p:sld xmlns:a="http://schemas.openxmlformats.org/drawingml/2006/main" xmlns:r="http://schemas.openxmlformats.org/officeDocument/2006/relationships" xmlns:p="http://schemas.openxmlformats.org/presentationml/2006/main">
-  <p:cSld>
-    <p:spTree>
-      <p:nvGrpSpPr>
-        <p:cNvPr id="1" name=""/>
-        <p:cNvGrpSpPr/>
-        <p:nvPr/>
-      </p:nvGrpSpPr>
-      <p:grpSpPr>
-        <a:xfrm>
-          <a:off x="0" y="0"/>
-          <a:ext cx="0" cy="0"/>
-          <a:chOff x="0" y="0"/>
-          <a:chExt cx="0" cy="0"/>
-        </a:xfrm>
-      </p:grpSpPr>
-      <p:sp>
-        <p:nvSpPr>
-          <p:cNvPr id="4098" name="Rectangle 2"/>
-          <p:cNvSpPr>
-            <a:spLocks noGrp="1" noChangeArrowheads="1"/>
-          </p:cNvSpPr>
-          <p:nvPr>
-            <p:ph type="title" idx="4294967295"/>
-          </p:nvPr>
-        </p:nvSpPr>
-        <p:spPr/>
-        <p:txBody>
-          <a:bodyPr/>
-          <a:lstStyle/>
-          <a:p>
-            <a:pPr algn="l" eaLnBrk="1" hangingPunct="1"/>
-            <a:r>
-              <a:rPr lang="en-US" dirty="0" smtClean="0"/>
-              <a:t>Business cycles:  who cares? </a:t>
-            </a:r>
-          </a:p>
-        </p:txBody>
-      </p:sp>
-      <p:sp>
-        <p:nvSpPr>
-          <p:cNvPr id="4099" name="Rectangle 3"/>
-          <p:cNvSpPr>
-            <a:spLocks noGrp="1" noChangeArrowheads="1"/>
-          </p:cNvSpPr>
-          <p:nvPr>
-            <p:ph type="body" idx="4294967295"/>
-          </p:nvPr>
-        </p:nvSpPr>
-        <p:spPr/>
-        <p:txBody>
-          <a:bodyPr/>
-          <a:lstStyle/>
-          <a:p>
-            <a:pPr eaLnBrk="1" hangingPunct="1">
-              <a:spcBef>
-                <a:spcPts val="1200"/>
-              </a:spcBef>
-              <a:spcAft>
-                <a:spcPts val="600"/>
-              </a:spcAft>
-            </a:pPr>
-            <a:r>
-              <a:rPr lang="en-US" sz="2400" dirty="0" smtClean="0"/>
-              <a:t>Finance </a:t>
-            </a:r>
-          </a:p>
-          <a:p>
-            <a:pPr lvl="1" eaLnBrk="1" hangingPunct="1">
-              <a:lnSpc>
-                <a:spcPct val="90000"/>
-              </a:lnSpc>
-              <a:spcBef>
-                <a:spcPts val="600"/>
-              </a:spcBef>
-            </a:pPr>
-            <a:r>
-              <a:rPr lang="en-US" sz="2000" dirty="0" smtClean="0"/>
-              <a:t>Fixed income </a:t>
-            </a:r>
-          </a:p>
-          <a:p>
-            <a:pPr lvl="1" eaLnBrk="1" hangingPunct="1">
-              <a:lnSpc>
-                <a:spcPct val="90000"/>
-              </a:lnSpc>
-              <a:spcBef>
-                <a:spcPts val="600"/>
-              </a:spcBef>
-            </a:pPr>
-            <a:r>
-              <a:rPr lang="en-US" sz="2000" dirty="0" smtClean="0"/>
-              <a:t>Currencies </a:t>
-            </a:r>
-          </a:p>
-          <a:p>
-            <a:pPr lvl="1" eaLnBrk="1" hangingPunct="1">
-              <a:lnSpc>
-                <a:spcPct val="90000"/>
-              </a:lnSpc>
-              <a:spcBef>
-                <a:spcPts val="600"/>
-              </a:spcBef>
-            </a:pPr>
-            <a:r>
-              <a:rPr lang="en-US" sz="2000" dirty="0" smtClean="0"/>
-              <a:t>Asset management </a:t>
-            </a:r>
-          </a:p>
-          <a:p>
-            <a:pPr lvl="1" eaLnBrk="1" hangingPunct="1">
-              <a:lnSpc>
-                <a:spcPct val="90000"/>
-              </a:lnSpc>
-              <a:spcBef>
-                <a:spcPts val="600"/>
-              </a:spcBef>
-            </a:pPr>
-            <a:r>
-              <a:rPr lang="en-US" sz="2000" dirty="0" smtClean="0"/>
-              <a:t>Equities, </a:t>
-            </a:r>
-            <a:r>
-              <a:rPr lang="en-US" sz="2000" dirty="0" err="1" smtClean="0"/>
-              <a:t>esp</a:t>
-            </a:r>
-            <a:r>
-              <a:rPr lang="en-US" sz="2000" dirty="0" smtClean="0"/>
-              <a:t> emerging markets </a:t>
-            </a:r>
-          </a:p>
-          <a:p>
-            <a:pPr eaLnBrk="1" hangingPunct="1">
-              <a:spcBef>
-                <a:spcPts val="1200"/>
-              </a:spcBef>
-            </a:pPr>
-            <a:r>
-              <a:rPr lang="en-US" sz="2400" dirty="0" smtClean="0"/>
-              <a:t>Media and marketing </a:t>
-            </a:r>
-          </a:p>
-          <a:p>
-            <a:pPr lvl="1" eaLnBrk="1" hangingPunct="1">
-              <a:spcBef>
-                <a:spcPts val="1200"/>
-              </a:spcBef>
-            </a:pPr>
-            <a:r>
-              <a:rPr lang="en-US" sz="2000" dirty="0" smtClean="0"/>
-              <a:t>Not a focus, but they’re unusually cyclical businesses </a:t>
-            </a:r>
-          </a:p>
-          <a:p>
-            <a:pPr eaLnBrk="1" hangingPunct="1">
-              <a:spcBef>
-                <a:spcPts val="1200"/>
-              </a:spcBef>
-            </a:pPr>
-            <a:r>
-              <a:rPr lang="en-US" sz="2400" dirty="0" smtClean="0"/>
-              <a:t>Everyone else </a:t>
-            </a:r>
-          </a:p>
-          <a:p>
-            <a:pPr lvl="1" eaLnBrk="1" hangingPunct="1">
-              <a:spcBef>
-                <a:spcPts val="1200"/>
-              </a:spcBef>
-            </a:pPr>
-            <a:r>
-              <a:rPr lang="en-US" sz="2000" dirty="0" smtClean="0"/>
-              <a:t>Fact of life you’ll have to deal with  </a:t>
-            </a:r>
-          </a:p>
-        </p:txBody>
-      </p:sp>
-      <p:sp>
-        <p:nvSpPr>
-          <p:cNvPr id="4100" name="Slide Number Placeholder 3"/>
-          <p:cNvSpPr>
-            <a:spLocks noGrp="1"/>
-          </p:cNvSpPr>
-          <p:nvPr>
-            <p:ph type="sldNum" sz="quarter" idx="12"/>
-          </p:nvPr>
-        </p:nvSpPr>
-        <p:spPr>
-          <a:noFill/>
-        </p:spPr>
-        <p:txBody>
-          <a:bodyPr/>
-          <a:lstStyle/>
-          <a:p>
-            <a:fld id="{E041A9CD-8F68-446A-8192-3D8982304C37}" type="slidenum">
-              <a:rPr lang="en-US" smtClean="0"/>
-              <a:pPr/>
-              <a:t>9</a:t>
-            </a:fld>
-            <a:endParaRPr lang="en-US" smtClean="0"/>
           </a:p>
         </p:txBody>
       </p:sp>

</xml_diff>